<commit_message>
Thesis chapter 3,4,5 and tex figures
</commit_message>
<xml_diff>
--- a/Bachelorarbeit/01_Bachelorarbeit_LaTex/02_Figures/interferences.pptx
+++ b/Bachelorarbeit/01_Bachelorarbeit_LaTex/02_Figures/interferences.pptx
@@ -7,6 +7,9 @@
   <p:sldIdLst>
     <p:sldId id="256" r:id="rId2"/>
     <p:sldId id="257" r:id="rId3"/>
+    <p:sldId id="258" r:id="rId4"/>
+    <p:sldId id="259" r:id="rId5"/>
+    <p:sldId id="260" r:id="rId6"/>
   </p:sldIdLst>
   <p:sldSz cx="12192000" cy="6858000"/>
   <p:notesSz cx="6858000" cy="9144000"/>
@@ -270,7 +273,7 @@
           <a:p>
             <a:fld id="{269D1000-EB28-4F8D-8A17-2635A5EDEDA0}" type="datetimeFigureOut">
               <a:rPr lang="de-DE" smtClean="0"/>
-              <a:t>03.12.2017</a:t>
+              <a:t>20.12.2017</a:t>
             </a:fld>
             <a:endParaRPr lang="de-DE"/>
           </a:p>
@@ -440,7 +443,7 @@
           <a:p>
             <a:fld id="{269D1000-EB28-4F8D-8A17-2635A5EDEDA0}" type="datetimeFigureOut">
               <a:rPr lang="de-DE" smtClean="0"/>
-              <a:t>03.12.2017</a:t>
+              <a:t>20.12.2017</a:t>
             </a:fld>
             <a:endParaRPr lang="de-DE"/>
           </a:p>
@@ -620,7 +623,7 @@
           <a:p>
             <a:fld id="{269D1000-EB28-4F8D-8A17-2635A5EDEDA0}" type="datetimeFigureOut">
               <a:rPr lang="de-DE" smtClean="0"/>
-              <a:t>03.12.2017</a:t>
+              <a:t>20.12.2017</a:t>
             </a:fld>
             <a:endParaRPr lang="de-DE"/>
           </a:p>
@@ -790,7 +793,7 @@
           <a:p>
             <a:fld id="{269D1000-EB28-4F8D-8A17-2635A5EDEDA0}" type="datetimeFigureOut">
               <a:rPr lang="de-DE" smtClean="0"/>
-              <a:t>03.12.2017</a:t>
+              <a:t>20.12.2017</a:t>
             </a:fld>
             <a:endParaRPr lang="de-DE"/>
           </a:p>
@@ -1036,7 +1039,7 @@
           <a:p>
             <a:fld id="{269D1000-EB28-4F8D-8A17-2635A5EDEDA0}" type="datetimeFigureOut">
               <a:rPr lang="de-DE" smtClean="0"/>
-              <a:t>03.12.2017</a:t>
+              <a:t>20.12.2017</a:t>
             </a:fld>
             <a:endParaRPr lang="de-DE"/>
           </a:p>
@@ -1268,7 +1271,7 @@
           <a:p>
             <a:fld id="{269D1000-EB28-4F8D-8A17-2635A5EDEDA0}" type="datetimeFigureOut">
               <a:rPr lang="de-DE" smtClean="0"/>
-              <a:t>03.12.2017</a:t>
+              <a:t>20.12.2017</a:t>
             </a:fld>
             <a:endParaRPr lang="de-DE"/>
           </a:p>
@@ -1635,7 +1638,7 @@
           <a:p>
             <a:fld id="{269D1000-EB28-4F8D-8A17-2635A5EDEDA0}" type="datetimeFigureOut">
               <a:rPr lang="de-DE" smtClean="0"/>
-              <a:t>03.12.2017</a:t>
+              <a:t>20.12.2017</a:t>
             </a:fld>
             <a:endParaRPr lang="de-DE"/>
           </a:p>
@@ -1753,7 +1756,7 @@
           <a:p>
             <a:fld id="{269D1000-EB28-4F8D-8A17-2635A5EDEDA0}" type="datetimeFigureOut">
               <a:rPr lang="de-DE" smtClean="0"/>
-              <a:t>03.12.2017</a:t>
+              <a:t>20.12.2017</a:t>
             </a:fld>
             <a:endParaRPr lang="de-DE"/>
           </a:p>
@@ -1848,7 +1851,7 @@
           <a:p>
             <a:fld id="{269D1000-EB28-4F8D-8A17-2635A5EDEDA0}" type="datetimeFigureOut">
               <a:rPr lang="de-DE" smtClean="0"/>
-              <a:t>03.12.2017</a:t>
+              <a:t>20.12.2017</a:t>
             </a:fld>
             <a:endParaRPr lang="de-DE"/>
           </a:p>
@@ -2125,7 +2128,7 @@
           <a:p>
             <a:fld id="{269D1000-EB28-4F8D-8A17-2635A5EDEDA0}" type="datetimeFigureOut">
               <a:rPr lang="de-DE" smtClean="0"/>
-              <a:t>03.12.2017</a:t>
+              <a:t>20.12.2017</a:t>
             </a:fld>
             <a:endParaRPr lang="de-DE"/>
           </a:p>
@@ -2378,7 +2381,7 @@
           <a:p>
             <a:fld id="{269D1000-EB28-4F8D-8A17-2635A5EDEDA0}" type="datetimeFigureOut">
               <a:rPr lang="de-DE" smtClean="0"/>
-              <a:t>03.12.2017</a:t>
+              <a:t>20.12.2017</a:t>
             </a:fld>
             <a:endParaRPr lang="de-DE"/>
           </a:p>
@@ -2591,7 +2594,7 @@
           <a:p>
             <a:fld id="{269D1000-EB28-4F8D-8A17-2635A5EDEDA0}" type="datetimeFigureOut">
               <a:rPr lang="de-DE" smtClean="0"/>
-              <a:t>03.12.2017</a:t>
+              <a:t>20.12.2017</a:t>
             </a:fld>
             <a:endParaRPr lang="de-DE"/>
           </a:p>
@@ -5540,9 +5543,8 @@
           <a:p>
             <a:r>
               <a:rPr lang="de-DE" u="sng" dirty="0"/>
-              <a:t>x</a:t>
-            </a:r>
-            <a:endParaRPr lang="de-DE" u="sng" dirty="0"/>
+              <a:t>u</a:t>
+            </a:r>
           </a:p>
         </p:txBody>
       </p:sp>
@@ -5585,7 +5587,7 @@
         <p:spPr>
           <a:xfrm>
             <a:off x="5134229" y="1018054"/>
-            <a:ext cx="280087" cy="369332"/>
+            <a:ext cx="470586" cy="369332"/>
           </a:xfrm>
           <a:prstGeom prst="rect">
             <a:avLst/>
@@ -5599,10 +5601,14 @@
           <a:lstStyle/>
           <a:p>
             <a:r>
-              <a:rPr lang="de-DE" u="sng" dirty="0"/>
-              <a:t>b</a:t>
-            </a:r>
-            <a:endParaRPr lang="de-DE" u="sng" dirty="0"/>
+              <a:rPr lang="de-DE" u="sng" dirty="0" smtClean="0"/>
+              <a:t>c</a:t>
+            </a:r>
+            <a:r>
+              <a:rPr lang="de-DE" dirty="0" smtClean="0"/>
+              <a:t>`</a:t>
+            </a:r>
+            <a:endParaRPr lang="de-DE" dirty="0"/>
           </a:p>
         </p:txBody>
       </p:sp>
@@ -5630,9 +5636,8 @@
           <a:p>
             <a:r>
               <a:rPr lang="de-DE" u="sng" dirty="0"/>
-              <a:t>s</a:t>
-            </a:r>
-            <a:endParaRPr lang="de-DE" u="sng" dirty="0"/>
+              <a:t>x</a:t>
+            </a:r>
           </a:p>
         </p:txBody>
       </p:sp>
@@ -5660,9 +5665,8 @@
           <a:p>
             <a:r>
               <a:rPr lang="de-DE" u="sng" dirty="0"/>
-              <a:t>r</a:t>
-            </a:r>
-            <a:endParaRPr lang="de-DE" u="sng" dirty="0"/>
+              <a:t>y</a:t>
+            </a:r>
           </a:p>
         </p:txBody>
       </p:sp>
@@ -5675,7 +5679,7 @@
         <p:spPr>
           <a:xfrm>
             <a:off x="5134228" y="3606105"/>
-            <a:ext cx="280087" cy="369332"/>
+            <a:ext cx="470587" cy="369332"/>
           </a:xfrm>
           <a:prstGeom prst="rect">
             <a:avLst/>
@@ -5690,9 +5694,13 @@
           <a:p>
             <a:r>
               <a:rPr lang="de-DE" u="sng" dirty="0" smtClean="0"/>
-              <a:t>p</a:t>
-            </a:r>
-            <a:endParaRPr lang="de-DE" u="sng" dirty="0"/>
+              <a:t>ĉ</a:t>
+            </a:r>
+            <a:r>
+              <a:rPr lang="de-DE" dirty="0" smtClean="0"/>
+              <a:t>`</a:t>
+            </a:r>
+            <a:endParaRPr lang="de-DE" dirty="0"/>
           </a:p>
         </p:txBody>
       </p:sp>
@@ -5719,8 +5727,8 @@
           <a:lstStyle/>
           <a:p>
             <a:r>
-              <a:rPr lang="de-DE" u="sng" dirty="0"/>
-              <a:t>d</a:t>
+              <a:rPr lang="de-DE" u="sng" dirty="0" smtClean="0"/>
+              <a:t>ĉ</a:t>
             </a:r>
             <a:endParaRPr lang="de-DE" u="sng" dirty="0"/>
           </a:p>
@@ -5749,10 +5757,9 @@
           <a:lstStyle/>
           <a:p>
             <a:r>
-              <a:rPr lang="de-DE" u="sng" dirty="0" smtClean="0"/>
-              <a:t>y</a:t>
-            </a:r>
-            <a:endParaRPr lang="de-DE" u="sng" dirty="0"/>
+              <a:rPr lang="de-DE" u="sng" dirty="0"/>
+              <a:t>ȗ</a:t>
+            </a:r>
           </a:p>
         </p:txBody>
       </p:sp>
@@ -5905,7 +5912,7 @@
         </p:nvSpPr>
         <p:spPr>
           <a:xfrm>
-            <a:off x="6207210" y="177114"/>
+            <a:off x="6194850" y="102332"/>
             <a:ext cx="1379839" cy="296562"/>
           </a:xfrm>
           <a:prstGeom prst="rect">
@@ -6042,6 +6049,2467 @@
     <p:extLst>
       <p:ext uri="{BB962C8B-B14F-4D97-AF65-F5344CB8AC3E}">
         <p14:creationId xmlns:p14="http://schemas.microsoft.com/office/powerpoint/2010/main" val="4260933887"/>
+      </p:ext>
+    </p:extLst>
+  </p:cSld>
+  <p:clrMapOvr>
+    <a:masterClrMapping/>
+  </p:clrMapOvr>
+</p:sld>
+</file>
+
+<file path=ppt/slides/slide3.xml><?xml version="1.0" encoding="utf-8"?>
+<p:sld xmlns:a="http://schemas.openxmlformats.org/drawingml/2006/main" xmlns:r="http://schemas.openxmlformats.org/officeDocument/2006/relationships" xmlns:p="http://schemas.openxmlformats.org/presentationml/2006/main">
+  <p:cSld>
+    <p:spTree>
+      <p:nvGrpSpPr>
+        <p:cNvPr id="1" name=""/>
+        <p:cNvGrpSpPr/>
+        <p:nvPr/>
+      </p:nvGrpSpPr>
+      <p:grpSpPr>
+        <a:xfrm>
+          <a:off x="0" y="0"/>
+          <a:ext cx="0" cy="0"/>
+          <a:chOff x="0" y="0"/>
+          <a:chExt cx="0" cy="0"/>
+        </a:xfrm>
+      </p:grpSpPr>
+      <p:cxnSp>
+        <p:nvCxnSpPr>
+          <p:cNvPr id="9" name="Gerade Verbindung mit Pfeil 8"/>
+          <p:cNvCxnSpPr/>
+          <p:nvPr/>
+        </p:nvCxnSpPr>
+        <p:spPr>
+          <a:xfrm>
+            <a:off x="1787856" y="3440723"/>
+            <a:ext cx="8461612" cy="0"/>
+          </a:xfrm>
+          <a:prstGeom prst="straightConnector1">
+            <a:avLst/>
+          </a:prstGeom>
+          <a:ln>
+            <a:prstDash val="solid"/>
+            <a:tailEnd type="triangle"/>
+          </a:ln>
+        </p:spPr>
+        <p:style>
+          <a:lnRef idx="1">
+            <a:schemeClr val="dk1"/>
+          </a:lnRef>
+          <a:fillRef idx="0">
+            <a:schemeClr val="dk1"/>
+          </a:fillRef>
+          <a:effectRef idx="0">
+            <a:schemeClr val="dk1"/>
+          </a:effectRef>
+          <a:fontRef idx="minor">
+            <a:schemeClr val="tx1"/>
+          </a:fontRef>
+        </p:style>
+      </p:cxnSp>
+      <p:cxnSp>
+        <p:nvCxnSpPr>
+          <p:cNvPr id="12" name="Gerade Verbindung mit Pfeil 11"/>
+          <p:cNvCxnSpPr/>
+          <p:nvPr/>
+        </p:nvCxnSpPr>
+        <p:spPr>
+          <a:xfrm flipV="1">
+            <a:off x="6100549" y="395785"/>
+            <a:ext cx="0" cy="5909481"/>
+          </a:xfrm>
+          <a:prstGeom prst="straightConnector1">
+            <a:avLst/>
+          </a:prstGeom>
+          <a:ln>
+            <a:tailEnd type="triangle"/>
+          </a:ln>
+        </p:spPr>
+        <p:style>
+          <a:lnRef idx="1">
+            <a:schemeClr val="dk1"/>
+          </a:lnRef>
+          <a:fillRef idx="0">
+            <a:schemeClr val="dk1"/>
+          </a:fillRef>
+          <a:effectRef idx="0">
+            <a:schemeClr val="dk1"/>
+          </a:effectRef>
+          <a:fontRef idx="minor">
+            <a:schemeClr val="tx1"/>
+          </a:fontRef>
+        </p:style>
+      </p:cxnSp>
+      <p:cxnSp>
+        <p:nvCxnSpPr>
+          <p:cNvPr id="15" name="Gerader Verbinder 14"/>
+          <p:cNvCxnSpPr/>
+          <p:nvPr/>
+        </p:nvCxnSpPr>
+        <p:spPr>
+          <a:xfrm flipH="1">
+            <a:off x="8082000" y="1080000"/>
+            <a:ext cx="360000" cy="360000"/>
+          </a:xfrm>
+          <a:prstGeom prst="line">
+            <a:avLst/>
+          </a:prstGeom>
+          <a:ln w="28575"/>
+        </p:spPr>
+        <p:style>
+          <a:lnRef idx="1">
+            <a:schemeClr val="dk1"/>
+          </a:lnRef>
+          <a:fillRef idx="0">
+            <a:schemeClr val="dk1"/>
+          </a:fillRef>
+          <a:effectRef idx="0">
+            <a:schemeClr val="dk1"/>
+          </a:effectRef>
+          <a:fontRef idx="minor">
+            <a:schemeClr val="tx1"/>
+          </a:fontRef>
+        </p:style>
+      </p:cxnSp>
+      <p:sp>
+        <p:nvSpPr>
+          <p:cNvPr id="26" name="Textfeld 25"/>
+          <p:cNvSpPr txBox="1"/>
+          <p:nvPr/>
+        </p:nvSpPr>
+        <p:spPr>
+          <a:xfrm>
+            <a:off x="9580728" y="3534770"/>
+            <a:ext cx="1337481" cy="400110"/>
+          </a:xfrm>
+          <a:prstGeom prst="rect">
+            <a:avLst/>
+          </a:prstGeom>
+          <a:noFill/>
+        </p:spPr>
+        <p:txBody>
+          <a:bodyPr wrap="square" rtlCol="0">
+            <a:spAutoFit/>
+          </a:bodyPr>
+          <a:lstStyle/>
+          <a:p>
+            <a:r>
+              <a:rPr lang="de-DE" sz="2000" dirty="0" smtClean="0">
+                <a:latin typeface="Arial" panose="020B0604020202020204" pitchFamily="34" charset="0"/>
+                <a:cs typeface="Arial" panose="020B0604020202020204" pitchFamily="34" charset="0"/>
+              </a:rPr>
+              <a:t>Inphase</a:t>
+            </a:r>
+            <a:endParaRPr lang="de-DE" sz="2000" dirty="0">
+              <a:latin typeface="Arial" panose="020B0604020202020204" pitchFamily="34" charset="0"/>
+              <a:cs typeface="Arial" panose="020B0604020202020204" pitchFamily="34" charset="0"/>
+            </a:endParaRPr>
+          </a:p>
+        </p:txBody>
+      </p:sp>
+      <p:sp>
+        <p:nvSpPr>
+          <p:cNvPr id="27" name="Textfeld 26"/>
+          <p:cNvSpPr txBox="1"/>
+          <p:nvPr/>
+        </p:nvSpPr>
+        <p:spPr>
+          <a:xfrm>
+            <a:off x="6200919" y="118528"/>
+            <a:ext cx="1572340" cy="707886"/>
+          </a:xfrm>
+          <a:prstGeom prst="rect">
+            <a:avLst/>
+          </a:prstGeom>
+          <a:noFill/>
+        </p:spPr>
+        <p:txBody>
+          <a:bodyPr wrap="square" rtlCol="0">
+            <a:spAutoFit/>
+          </a:bodyPr>
+          <a:lstStyle/>
+          <a:p>
+            <a:r>
+              <a:rPr lang="de-DE" sz="2000" dirty="0" smtClean="0">
+                <a:latin typeface="Arial" panose="020B0604020202020204" pitchFamily="34" charset="0"/>
+                <a:cs typeface="Arial" panose="020B0604020202020204" pitchFamily="34" charset="0"/>
+              </a:rPr>
+              <a:t>Quadrature phase</a:t>
+            </a:r>
+            <a:endParaRPr lang="de-DE" sz="2000" dirty="0">
+              <a:latin typeface="Arial" panose="020B0604020202020204" pitchFamily="34" charset="0"/>
+              <a:cs typeface="Arial" panose="020B0604020202020204" pitchFamily="34" charset="0"/>
+            </a:endParaRPr>
+          </a:p>
+        </p:txBody>
+      </p:sp>
+      <p:sp>
+        <p:nvSpPr>
+          <p:cNvPr id="28" name="Textfeld 27"/>
+          <p:cNvSpPr txBox="1"/>
+          <p:nvPr/>
+        </p:nvSpPr>
+        <p:spPr>
+          <a:xfrm>
+            <a:off x="7773259" y="510713"/>
+            <a:ext cx="1337481" cy="400110"/>
+          </a:xfrm>
+          <a:prstGeom prst="rect">
+            <a:avLst/>
+          </a:prstGeom>
+          <a:noFill/>
+        </p:spPr>
+        <p:txBody>
+          <a:bodyPr wrap="square" rtlCol="0">
+            <a:spAutoFit/>
+          </a:bodyPr>
+          <a:lstStyle/>
+          <a:p>
+            <a:r>
+              <a:rPr lang="de-DE" sz="2000" dirty="0" smtClean="0">
+                <a:latin typeface="Arial" panose="020B0604020202020204" pitchFamily="34" charset="0"/>
+                <a:cs typeface="Arial" panose="020B0604020202020204" pitchFamily="34" charset="0"/>
+              </a:rPr>
+              <a:t>Bit X</a:t>
+            </a:r>
+            <a:r>
+              <a:rPr lang="de-DE" sz="2000" baseline="-25000" dirty="0" smtClean="0">
+                <a:latin typeface="Arial" panose="020B0604020202020204" pitchFamily="34" charset="0"/>
+                <a:cs typeface="Arial" panose="020B0604020202020204" pitchFamily="34" charset="0"/>
+              </a:rPr>
+              <a:t>1</a:t>
+            </a:r>
+            <a:r>
+              <a:rPr lang="de-DE" sz="2000" dirty="0" smtClean="0">
+                <a:latin typeface="Arial" panose="020B0604020202020204" pitchFamily="34" charset="0"/>
+                <a:cs typeface="Arial" panose="020B0604020202020204" pitchFamily="34" charset="0"/>
+              </a:rPr>
+              <a:t>: 11</a:t>
+            </a:r>
+            <a:endParaRPr lang="de-DE" sz="2000" dirty="0">
+              <a:latin typeface="Arial" panose="020B0604020202020204" pitchFamily="34" charset="0"/>
+              <a:cs typeface="Arial" panose="020B0604020202020204" pitchFamily="34" charset="0"/>
+            </a:endParaRPr>
+          </a:p>
+        </p:txBody>
+      </p:sp>
+      <p:sp>
+        <p:nvSpPr>
+          <p:cNvPr id="29" name="Rechteck 28"/>
+          <p:cNvSpPr/>
+          <p:nvPr/>
+        </p:nvSpPr>
+        <p:spPr>
+          <a:xfrm>
+            <a:off x="3699507" y="2103828"/>
+            <a:ext cx="2310248" cy="400110"/>
+          </a:xfrm>
+          <a:prstGeom prst="rect">
+            <a:avLst/>
+          </a:prstGeom>
+        </p:spPr>
+        <p:txBody>
+          <a:bodyPr wrap="none">
+            <a:spAutoFit/>
+          </a:bodyPr>
+          <a:lstStyle/>
+          <a:p>
+            <a:r>
+              <a:rPr lang="de-DE" sz="2000" dirty="0" smtClean="0">
+                <a:solidFill>
+                  <a:srgbClr val="00B050"/>
+                </a:solidFill>
+                <a:latin typeface="Arial" panose="020B0604020202020204" pitchFamily="34" charset="0"/>
+                <a:cs typeface="Arial" panose="020B0604020202020204" pitchFamily="34" charset="0"/>
+              </a:rPr>
+              <a:t>Decision boundary</a:t>
+            </a:r>
+            <a:endParaRPr lang="de-DE" sz="2000" dirty="0">
+              <a:solidFill>
+                <a:srgbClr val="00B050"/>
+              </a:solidFill>
+              <a:latin typeface="Arial" panose="020B0604020202020204" pitchFamily="34" charset="0"/>
+              <a:cs typeface="Arial" panose="020B0604020202020204" pitchFamily="34" charset="0"/>
+            </a:endParaRPr>
+          </a:p>
+        </p:txBody>
+      </p:sp>
+      <p:cxnSp>
+        <p:nvCxnSpPr>
+          <p:cNvPr id="43" name="Gerader Verbinder 42"/>
+          <p:cNvCxnSpPr/>
+          <p:nvPr/>
+        </p:nvCxnSpPr>
+        <p:spPr>
+          <a:xfrm>
+            <a:off x="5964071" y="2702257"/>
+            <a:ext cx="272956" cy="0"/>
+          </a:xfrm>
+          <a:prstGeom prst="line">
+            <a:avLst/>
+          </a:prstGeom>
+        </p:spPr>
+        <p:style>
+          <a:lnRef idx="1">
+            <a:schemeClr val="dk1"/>
+          </a:lnRef>
+          <a:fillRef idx="0">
+            <a:schemeClr val="dk1"/>
+          </a:fillRef>
+          <a:effectRef idx="0">
+            <a:schemeClr val="dk1"/>
+          </a:effectRef>
+          <a:fontRef idx="minor">
+            <a:schemeClr val="tx1"/>
+          </a:fontRef>
+        </p:style>
+      </p:cxnSp>
+      <p:cxnSp>
+        <p:nvCxnSpPr>
+          <p:cNvPr id="45" name="Gerader Verbinder 44"/>
+          <p:cNvCxnSpPr/>
+          <p:nvPr/>
+        </p:nvCxnSpPr>
+        <p:spPr>
+          <a:xfrm>
+            <a:off x="5964071" y="1992573"/>
+            <a:ext cx="272956" cy="0"/>
+          </a:xfrm>
+          <a:prstGeom prst="line">
+            <a:avLst/>
+          </a:prstGeom>
+        </p:spPr>
+        <p:style>
+          <a:lnRef idx="1">
+            <a:schemeClr val="dk1"/>
+          </a:lnRef>
+          <a:fillRef idx="0">
+            <a:schemeClr val="dk1"/>
+          </a:fillRef>
+          <a:effectRef idx="0">
+            <a:schemeClr val="dk1"/>
+          </a:effectRef>
+          <a:fontRef idx="minor">
+            <a:schemeClr val="tx1"/>
+          </a:fontRef>
+        </p:style>
+      </p:cxnSp>
+      <p:cxnSp>
+        <p:nvCxnSpPr>
+          <p:cNvPr id="46" name="Gerader Verbinder 45"/>
+          <p:cNvCxnSpPr/>
+          <p:nvPr/>
+        </p:nvCxnSpPr>
+        <p:spPr>
+          <a:xfrm>
+            <a:off x="5964071" y="1262418"/>
+            <a:ext cx="272956" cy="0"/>
+          </a:xfrm>
+          <a:prstGeom prst="line">
+            <a:avLst/>
+          </a:prstGeom>
+        </p:spPr>
+        <p:style>
+          <a:lnRef idx="1">
+            <a:schemeClr val="dk1"/>
+          </a:lnRef>
+          <a:fillRef idx="0">
+            <a:schemeClr val="dk1"/>
+          </a:fillRef>
+          <a:effectRef idx="0">
+            <a:schemeClr val="dk1"/>
+          </a:effectRef>
+          <a:fontRef idx="minor">
+            <a:schemeClr val="tx1"/>
+          </a:fontRef>
+        </p:style>
+      </p:cxnSp>
+      <p:cxnSp>
+        <p:nvCxnSpPr>
+          <p:cNvPr id="47" name="Gerader Verbinder 46"/>
+          <p:cNvCxnSpPr/>
+          <p:nvPr/>
+        </p:nvCxnSpPr>
+        <p:spPr>
+          <a:xfrm>
+            <a:off x="5964071" y="4148919"/>
+            <a:ext cx="272956" cy="0"/>
+          </a:xfrm>
+          <a:prstGeom prst="line">
+            <a:avLst/>
+          </a:prstGeom>
+        </p:spPr>
+        <p:style>
+          <a:lnRef idx="1">
+            <a:schemeClr val="dk1"/>
+          </a:lnRef>
+          <a:fillRef idx="0">
+            <a:schemeClr val="dk1"/>
+          </a:fillRef>
+          <a:effectRef idx="0">
+            <a:schemeClr val="dk1"/>
+          </a:effectRef>
+          <a:fontRef idx="minor">
+            <a:schemeClr val="tx1"/>
+          </a:fontRef>
+        </p:style>
+      </p:cxnSp>
+      <p:cxnSp>
+        <p:nvCxnSpPr>
+          <p:cNvPr id="48" name="Gerader Verbinder 47"/>
+          <p:cNvCxnSpPr/>
+          <p:nvPr/>
+        </p:nvCxnSpPr>
+        <p:spPr>
+          <a:xfrm>
+            <a:off x="5977719" y="4872251"/>
+            <a:ext cx="272956" cy="0"/>
+          </a:xfrm>
+          <a:prstGeom prst="line">
+            <a:avLst/>
+          </a:prstGeom>
+        </p:spPr>
+        <p:style>
+          <a:lnRef idx="1">
+            <a:schemeClr val="dk1"/>
+          </a:lnRef>
+          <a:fillRef idx="0">
+            <a:schemeClr val="dk1"/>
+          </a:fillRef>
+          <a:effectRef idx="0">
+            <a:schemeClr val="dk1"/>
+          </a:effectRef>
+          <a:fontRef idx="minor">
+            <a:schemeClr val="tx1"/>
+          </a:fontRef>
+        </p:style>
+      </p:cxnSp>
+      <p:cxnSp>
+        <p:nvCxnSpPr>
+          <p:cNvPr id="50" name="Gerader Verbinder 49"/>
+          <p:cNvCxnSpPr/>
+          <p:nvPr/>
+        </p:nvCxnSpPr>
+        <p:spPr>
+          <a:xfrm>
+            <a:off x="5964071" y="5598000"/>
+            <a:ext cx="272956" cy="0"/>
+          </a:xfrm>
+          <a:prstGeom prst="line">
+            <a:avLst/>
+          </a:prstGeom>
+        </p:spPr>
+        <p:style>
+          <a:lnRef idx="1">
+            <a:schemeClr val="dk1"/>
+          </a:lnRef>
+          <a:fillRef idx="0">
+            <a:schemeClr val="dk1"/>
+          </a:fillRef>
+          <a:effectRef idx="0">
+            <a:schemeClr val="dk1"/>
+          </a:effectRef>
+          <a:fontRef idx="minor">
+            <a:schemeClr val="tx1"/>
+          </a:fontRef>
+        </p:style>
+      </p:cxnSp>
+      <p:cxnSp>
+        <p:nvCxnSpPr>
+          <p:cNvPr id="51" name="Gerader Verbinder 50"/>
+          <p:cNvCxnSpPr/>
+          <p:nvPr/>
+        </p:nvCxnSpPr>
+        <p:spPr>
+          <a:xfrm>
+            <a:off x="5377218" y="3276600"/>
+            <a:ext cx="0" cy="297975"/>
+          </a:xfrm>
+          <a:prstGeom prst="line">
+            <a:avLst/>
+          </a:prstGeom>
+        </p:spPr>
+        <p:style>
+          <a:lnRef idx="1">
+            <a:schemeClr val="dk1"/>
+          </a:lnRef>
+          <a:fillRef idx="0">
+            <a:schemeClr val="dk1"/>
+          </a:fillRef>
+          <a:effectRef idx="0">
+            <a:schemeClr val="dk1"/>
+          </a:effectRef>
+          <a:fontRef idx="minor">
+            <a:schemeClr val="tx1"/>
+          </a:fontRef>
+        </p:style>
+      </p:cxnSp>
+      <p:cxnSp>
+        <p:nvCxnSpPr>
+          <p:cNvPr id="54" name="Gerader Verbinder 53"/>
+          <p:cNvCxnSpPr/>
+          <p:nvPr/>
+        </p:nvCxnSpPr>
+        <p:spPr>
+          <a:xfrm>
+            <a:off x="4656161" y="3292521"/>
+            <a:ext cx="0" cy="297975"/>
+          </a:xfrm>
+          <a:prstGeom prst="line">
+            <a:avLst/>
+          </a:prstGeom>
+        </p:spPr>
+        <p:style>
+          <a:lnRef idx="1">
+            <a:schemeClr val="dk1"/>
+          </a:lnRef>
+          <a:fillRef idx="0">
+            <a:schemeClr val="dk1"/>
+          </a:fillRef>
+          <a:effectRef idx="0">
+            <a:schemeClr val="dk1"/>
+          </a:effectRef>
+          <a:fontRef idx="minor">
+            <a:schemeClr val="tx1"/>
+          </a:fontRef>
+        </p:style>
+      </p:cxnSp>
+      <p:cxnSp>
+        <p:nvCxnSpPr>
+          <p:cNvPr id="55" name="Gerader Verbinder 54"/>
+          <p:cNvCxnSpPr/>
+          <p:nvPr/>
+        </p:nvCxnSpPr>
+        <p:spPr>
+          <a:xfrm>
+            <a:off x="3934800" y="3292521"/>
+            <a:ext cx="0" cy="297975"/>
+          </a:xfrm>
+          <a:prstGeom prst="line">
+            <a:avLst/>
+          </a:prstGeom>
+        </p:spPr>
+        <p:style>
+          <a:lnRef idx="1">
+            <a:schemeClr val="dk1"/>
+          </a:lnRef>
+          <a:fillRef idx="0">
+            <a:schemeClr val="dk1"/>
+          </a:fillRef>
+          <a:effectRef idx="0">
+            <a:schemeClr val="dk1"/>
+          </a:effectRef>
+          <a:fontRef idx="minor">
+            <a:schemeClr val="tx1"/>
+          </a:fontRef>
+        </p:style>
+      </p:cxnSp>
+      <p:cxnSp>
+        <p:nvCxnSpPr>
+          <p:cNvPr id="56" name="Gerader Verbinder 55"/>
+          <p:cNvCxnSpPr/>
+          <p:nvPr/>
+        </p:nvCxnSpPr>
+        <p:spPr>
+          <a:xfrm>
+            <a:off x="3218400" y="3291736"/>
+            <a:ext cx="0" cy="297975"/>
+          </a:xfrm>
+          <a:prstGeom prst="line">
+            <a:avLst/>
+          </a:prstGeom>
+        </p:spPr>
+        <p:style>
+          <a:lnRef idx="1">
+            <a:schemeClr val="dk1"/>
+          </a:lnRef>
+          <a:fillRef idx="0">
+            <a:schemeClr val="dk1"/>
+          </a:fillRef>
+          <a:effectRef idx="0">
+            <a:schemeClr val="dk1"/>
+          </a:effectRef>
+          <a:fontRef idx="minor">
+            <a:schemeClr val="tx1"/>
+          </a:fontRef>
+        </p:style>
+      </p:cxnSp>
+      <p:cxnSp>
+        <p:nvCxnSpPr>
+          <p:cNvPr id="57" name="Gerader Verbinder 56"/>
+          <p:cNvCxnSpPr/>
+          <p:nvPr/>
+        </p:nvCxnSpPr>
+        <p:spPr>
+          <a:xfrm>
+            <a:off x="6804000" y="3291736"/>
+            <a:ext cx="0" cy="297975"/>
+          </a:xfrm>
+          <a:prstGeom prst="line">
+            <a:avLst/>
+          </a:prstGeom>
+        </p:spPr>
+        <p:style>
+          <a:lnRef idx="1">
+            <a:schemeClr val="dk1"/>
+          </a:lnRef>
+          <a:fillRef idx="0">
+            <a:schemeClr val="dk1"/>
+          </a:fillRef>
+          <a:effectRef idx="0">
+            <a:schemeClr val="dk1"/>
+          </a:effectRef>
+          <a:fontRef idx="minor">
+            <a:schemeClr val="tx1"/>
+          </a:fontRef>
+        </p:style>
+      </p:cxnSp>
+      <p:cxnSp>
+        <p:nvCxnSpPr>
+          <p:cNvPr id="58" name="Gerader Verbinder 57"/>
+          <p:cNvCxnSpPr/>
+          <p:nvPr/>
+        </p:nvCxnSpPr>
+        <p:spPr>
+          <a:xfrm>
+            <a:off x="7538400" y="3291735"/>
+            <a:ext cx="0" cy="297975"/>
+          </a:xfrm>
+          <a:prstGeom prst="line">
+            <a:avLst/>
+          </a:prstGeom>
+        </p:spPr>
+        <p:style>
+          <a:lnRef idx="1">
+            <a:schemeClr val="dk1"/>
+          </a:lnRef>
+          <a:fillRef idx="0">
+            <a:schemeClr val="dk1"/>
+          </a:fillRef>
+          <a:effectRef idx="0">
+            <a:schemeClr val="dk1"/>
+          </a:effectRef>
+          <a:fontRef idx="minor">
+            <a:schemeClr val="tx1"/>
+          </a:fontRef>
+        </p:style>
+      </p:cxnSp>
+      <p:cxnSp>
+        <p:nvCxnSpPr>
+          <p:cNvPr id="59" name="Gerader Verbinder 58"/>
+          <p:cNvCxnSpPr/>
+          <p:nvPr/>
+        </p:nvCxnSpPr>
+        <p:spPr>
+          <a:xfrm>
+            <a:off x="8256895" y="3291734"/>
+            <a:ext cx="0" cy="297975"/>
+          </a:xfrm>
+          <a:prstGeom prst="line">
+            <a:avLst/>
+          </a:prstGeom>
+        </p:spPr>
+        <p:style>
+          <a:lnRef idx="1">
+            <a:schemeClr val="dk1"/>
+          </a:lnRef>
+          <a:fillRef idx="0">
+            <a:schemeClr val="dk1"/>
+          </a:fillRef>
+          <a:effectRef idx="0">
+            <a:schemeClr val="dk1"/>
+          </a:effectRef>
+          <a:fontRef idx="minor">
+            <a:schemeClr val="tx1"/>
+          </a:fontRef>
+        </p:style>
+      </p:cxnSp>
+      <p:cxnSp>
+        <p:nvCxnSpPr>
+          <p:cNvPr id="60" name="Gerader Verbinder 59"/>
+          <p:cNvCxnSpPr/>
+          <p:nvPr/>
+        </p:nvCxnSpPr>
+        <p:spPr>
+          <a:xfrm>
+            <a:off x="8964000" y="3291733"/>
+            <a:ext cx="0" cy="297975"/>
+          </a:xfrm>
+          <a:prstGeom prst="line">
+            <a:avLst/>
+          </a:prstGeom>
+        </p:spPr>
+        <p:style>
+          <a:lnRef idx="1">
+            <a:schemeClr val="dk1"/>
+          </a:lnRef>
+          <a:fillRef idx="0">
+            <a:schemeClr val="dk1"/>
+          </a:fillRef>
+          <a:effectRef idx="0">
+            <a:schemeClr val="dk1"/>
+          </a:effectRef>
+          <a:fontRef idx="minor">
+            <a:schemeClr val="tx1"/>
+          </a:fontRef>
+        </p:style>
+      </p:cxnSp>
+      <p:cxnSp>
+        <p:nvCxnSpPr>
+          <p:cNvPr id="61" name="Gerader Verbinder 60"/>
+          <p:cNvCxnSpPr/>
+          <p:nvPr/>
+        </p:nvCxnSpPr>
+        <p:spPr>
+          <a:xfrm flipH="1" flipV="1">
+            <a:off x="8082000" y="1080000"/>
+            <a:ext cx="360000" cy="360000"/>
+          </a:xfrm>
+          <a:prstGeom prst="line">
+            <a:avLst/>
+          </a:prstGeom>
+          <a:ln w="28575"/>
+        </p:spPr>
+        <p:style>
+          <a:lnRef idx="1">
+            <a:schemeClr val="dk1"/>
+          </a:lnRef>
+          <a:fillRef idx="0">
+            <a:schemeClr val="dk1"/>
+          </a:fillRef>
+          <a:effectRef idx="0">
+            <a:schemeClr val="dk1"/>
+          </a:effectRef>
+          <a:fontRef idx="minor">
+            <a:schemeClr val="tx1"/>
+          </a:fontRef>
+        </p:style>
+      </p:cxnSp>
+      <p:cxnSp>
+        <p:nvCxnSpPr>
+          <p:cNvPr id="63" name="Gerader Verbinder 62"/>
+          <p:cNvCxnSpPr/>
+          <p:nvPr/>
+        </p:nvCxnSpPr>
+        <p:spPr>
+          <a:xfrm flipH="1">
+            <a:off x="8086298" y="5418000"/>
+            <a:ext cx="360000" cy="360000"/>
+          </a:xfrm>
+          <a:prstGeom prst="line">
+            <a:avLst/>
+          </a:prstGeom>
+          <a:ln w="28575"/>
+        </p:spPr>
+        <p:style>
+          <a:lnRef idx="1">
+            <a:schemeClr val="dk1"/>
+          </a:lnRef>
+          <a:fillRef idx="0">
+            <a:schemeClr val="dk1"/>
+          </a:fillRef>
+          <a:effectRef idx="0">
+            <a:schemeClr val="dk1"/>
+          </a:effectRef>
+          <a:fontRef idx="minor">
+            <a:schemeClr val="tx1"/>
+          </a:fontRef>
+        </p:style>
+      </p:cxnSp>
+      <p:cxnSp>
+        <p:nvCxnSpPr>
+          <p:cNvPr id="64" name="Gerader Verbinder 63"/>
+          <p:cNvCxnSpPr/>
+          <p:nvPr/>
+        </p:nvCxnSpPr>
+        <p:spPr>
+          <a:xfrm flipH="1" flipV="1">
+            <a:off x="8086298" y="5418000"/>
+            <a:ext cx="360000" cy="360000"/>
+          </a:xfrm>
+          <a:prstGeom prst="line">
+            <a:avLst/>
+          </a:prstGeom>
+          <a:ln w="28575"/>
+        </p:spPr>
+        <p:style>
+          <a:lnRef idx="1">
+            <a:schemeClr val="dk1"/>
+          </a:lnRef>
+          <a:fillRef idx="0">
+            <a:schemeClr val="dk1"/>
+          </a:fillRef>
+          <a:effectRef idx="0">
+            <a:schemeClr val="dk1"/>
+          </a:effectRef>
+          <a:fontRef idx="minor">
+            <a:schemeClr val="tx1"/>
+          </a:fontRef>
+        </p:style>
+      </p:cxnSp>
+      <p:cxnSp>
+        <p:nvCxnSpPr>
+          <p:cNvPr id="65" name="Gerader Verbinder 64"/>
+          <p:cNvCxnSpPr/>
+          <p:nvPr/>
+        </p:nvCxnSpPr>
+        <p:spPr>
+          <a:xfrm flipH="1">
+            <a:off x="3766780" y="5418000"/>
+            <a:ext cx="360000" cy="360000"/>
+          </a:xfrm>
+          <a:prstGeom prst="line">
+            <a:avLst/>
+          </a:prstGeom>
+          <a:ln w="28575"/>
+        </p:spPr>
+        <p:style>
+          <a:lnRef idx="1">
+            <a:schemeClr val="dk1"/>
+          </a:lnRef>
+          <a:fillRef idx="0">
+            <a:schemeClr val="dk1"/>
+          </a:fillRef>
+          <a:effectRef idx="0">
+            <a:schemeClr val="dk1"/>
+          </a:effectRef>
+          <a:fontRef idx="minor">
+            <a:schemeClr val="tx1"/>
+          </a:fontRef>
+        </p:style>
+      </p:cxnSp>
+      <p:cxnSp>
+        <p:nvCxnSpPr>
+          <p:cNvPr id="66" name="Gerader Verbinder 65"/>
+          <p:cNvCxnSpPr/>
+          <p:nvPr/>
+        </p:nvCxnSpPr>
+        <p:spPr>
+          <a:xfrm flipH="1" flipV="1">
+            <a:off x="3766780" y="5418000"/>
+            <a:ext cx="360000" cy="360000"/>
+          </a:xfrm>
+          <a:prstGeom prst="line">
+            <a:avLst/>
+          </a:prstGeom>
+          <a:ln w="28575"/>
+        </p:spPr>
+        <p:style>
+          <a:lnRef idx="1">
+            <a:schemeClr val="dk1"/>
+          </a:lnRef>
+          <a:fillRef idx="0">
+            <a:schemeClr val="dk1"/>
+          </a:fillRef>
+          <a:effectRef idx="0">
+            <a:schemeClr val="dk1"/>
+          </a:effectRef>
+          <a:fontRef idx="minor">
+            <a:schemeClr val="tx1"/>
+          </a:fontRef>
+        </p:style>
+      </p:cxnSp>
+      <p:cxnSp>
+        <p:nvCxnSpPr>
+          <p:cNvPr id="67" name="Gerader Verbinder 66"/>
+          <p:cNvCxnSpPr/>
+          <p:nvPr/>
+        </p:nvCxnSpPr>
+        <p:spPr>
+          <a:xfrm flipH="1">
+            <a:off x="3765600" y="1080000"/>
+            <a:ext cx="360000" cy="360000"/>
+          </a:xfrm>
+          <a:prstGeom prst="line">
+            <a:avLst/>
+          </a:prstGeom>
+          <a:ln w="28575"/>
+        </p:spPr>
+        <p:style>
+          <a:lnRef idx="1">
+            <a:schemeClr val="dk1"/>
+          </a:lnRef>
+          <a:fillRef idx="0">
+            <a:schemeClr val="dk1"/>
+          </a:fillRef>
+          <a:effectRef idx="0">
+            <a:schemeClr val="dk1"/>
+          </a:effectRef>
+          <a:fontRef idx="minor">
+            <a:schemeClr val="tx1"/>
+          </a:fontRef>
+        </p:style>
+      </p:cxnSp>
+      <p:cxnSp>
+        <p:nvCxnSpPr>
+          <p:cNvPr id="68" name="Gerader Verbinder 67"/>
+          <p:cNvCxnSpPr/>
+          <p:nvPr/>
+        </p:nvCxnSpPr>
+        <p:spPr>
+          <a:xfrm flipH="1" flipV="1">
+            <a:off x="3765600" y="1080000"/>
+            <a:ext cx="360000" cy="360000"/>
+          </a:xfrm>
+          <a:prstGeom prst="line">
+            <a:avLst/>
+          </a:prstGeom>
+          <a:ln w="28575"/>
+        </p:spPr>
+        <p:style>
+          <a:lnRef idx="1">
+            <a:schemeClr val="dk1"/>
+          </a:lnRef>
+          <a:fillRef idx="0">
+            <a:schemeClr val="dk1"/>
+          </a:fillRef>
+          <a:effectRef idx="0">
+            <a:schemeClr val="dk1"/>
+          </a:effectRef>
+          <a:fontRef idx="minor">
+            <a:schemeClr val="tx1"/>
+          </a:fontRef>
+        </p:style>
+      </p:cxnSp>
+      <p:sp>
+        <p:nvSpPr>
+          <p:cNvPr id="69" name="Rechteck 68"/>
+          <p:cNvSpPr/>
+          <p:nvPr/>
+        </p:nvSpPr>
+        <p:spPr>
+          <a:xfrm>
+            <a:off x="3367978" y="6004750"/>
+            <a:ext cx="1247457" cy="400110"/>
+          </a:xfrm>
+          <a:prstGeom prst="rect">
+            <a:avLst/>
+          </a:prstGeom>
+        </p:spPr>
+        <p:txBody>
+          <a:bodyPr wrap="none">
+            <a:spAutoFit/>
+          </a:bodyPr>
+          <a:lstStyle/>
+          <a:p>
+            <a:r>
+              <a:rPr lang="de-DE" sz="2000" dirty="0">
+                <a:latin typeface="Arial" panose="020B0604020202020204" pitchFamily="34" charset="0"/>
+                <a:cs typeface="Arial" panose="020B0604020202020204" pitchFamily="34" charset="0"/>
+              </a:rPr>
+              <a:t>Bit </a:t>
+            </a:r>
+            <a:r>
+              <a:rPr lang="de-DE" sz="2000" dirty="0" smtClean="0">
+                <a:latin typeface="Arial" panose="020B0604020202020204" pitchFamily="34" charset="0"/>
+                <a:cs typeface="Arial" panose="020B0604020202020204" pitchFamily="34" charset="0"/>
+              </a:rPr>
+              <a:t>X</a:t>
+            </a:r>
+            <a:r>
+              <a:rPr lang="de-DE" sz="2000" baseline="-25000" dirty="0">
+                <a:latin typeface="Arial" panose="020B0604020202020204" pitchFamily="34" charset="0"/>
+                <a:cs typeface="Arial" panose="020B0604020202020204" pitchFamily="34" charset="0"/>
+              </a:rPr>
+              <a:t>3</a:t>
+            </a:r>
+            <a:r>
+              <a:rPr lang="de-DE" sz="2000" dirty="0" smtClean="0">
+                <a:latin typeface="Arial" panose="020B0604020202020204" pitchFamily="34" charset="0"/>
+                <a:cs typeface="Arial" panose="020B0604020202020204" pitchFamily="34" charset="0"/>
+              </a:rPr>
+              <a:t>: 00</a:t>
+            </a:r>
+            <a:endParaRPr lang="de-DE" sz="2000" dirty="0">
+              <a:latin typeface="Arial" panose="020B0604020202020204" pitchFamily="34" charset="0"/>
+              <a:cs typeface="Arial" panose="020B0604020202020204" pitchFamily="34" charset="0"/>
+            </a:endParaRPr>
+          </a:p>
+        </p:txBody>
+      </p:sp>
+      <p:sp>
+        <p:nvSpPr>
+          <p:cNvPr id="70" name="Rechteck 69"/>
+          <p:cNvSpPr/>
+          <p:nvPr/>
+        </p:nvSpPr>
+        <p:spPr>
+          <a:xfrm>
+            <a:off x="3412609" y="510713"/>
+            <a:ext cx="1247457" cy="400110"/>
+          </a:xfrm>
+          <a:prstGeom prst="rect">
+            <a:avLst/>
+          </a:prstGeom>
+        </p:spPr>
+        <p:txBody>
+          <a:bodyPr wrap="none">
+            <a:spAutoFit/>
+          </a:bodyPr>
+          <a:lstStyle/>
+          <a:p>
+            <a:r>
+              <a:rPr lang="de-DE" sz="2000" dirty="0">
+                <a:latin typeface="Arial" panose="020B0604020202020204" pitchFamily="34" charset="0"/>
+                <a:cs typeface="Arial" panose="020B0604020202020204" pitchFamily="34" charset="0"/>
+              </a:rPr>
+              <a:t>Bit </a:t>
+            </a:r>
+            <a:r>
+              <a:rPr lang="de-DE" sz="2000" dirty="0" smtClean="0">
+                <a:latin typeface="Arial" panose="020B0604020202020204" pitchFamily="34" charset="0"/>
+                <a:cs typeface="Arial" panose="020B0604020202020204" pitchFamily="34" charset="0"/>
+              </a:rPr>
+              <a:t>X</a:t>
+            </a:r>
+            <a:r>
+              <a:rPr lang="de-DE" sz="2000" baseline="-25000" dirty="0">
+                <a:latin typeface="Arial" panose="020B0604020202020204" pitchFamily="34" charset="0"/>
+                <a:cs typeface="Arial" panose="020B0604020202020204" pitchFamily="34" charset="0"/>
+              </a:rPr>
+              <a:t>4</a:t>
+            </a:r>
+            <a:r>
+              <a:rPr lang="de-DE" sz="2000" dirty="0" smtClean="0">
+                <a:latin typeface="Arial" panose="020B0604020202020204" pitchFamily="34" charset="0"/>
+                <a:cs typeface="Arial" panose="020B0604020202020204" pitchFamily="34" charset="0"/>
+              </a:rPr>
+              <a:t>: 10</a:t>
+            </a:r>
+            <a:endParaRPr lang="de-DE" sz="2000" dirty="0">
+              <a:latin typeface="Arial" panose="020B0604020202020204" pitchFamily="34" charset="0"/>
+              <a:cs typeface="Arial" panose="020B0604020202020204" pitchFamily="34" charset="0"/>
+            </a:endParaRPr>
+          </a:p>
+        </p:txBody>
+      </p:sp>
+      <p:sp>
+        <p:nvSpPr>
+          <p:cNvPr id="71" name="Geschweifte Klammer rechts 70"/>
+          <p:cNvSpPr/>
+          <p:nvPr/>
+        </p:nvSpPr>
+        <p:spPr>
+          <a:xfrm>
+            <a:off x="8742394" y="1256587"/>
+            <a:ext cx="602833" cy="4338000"/>
+          </a:xfrm>
+          <a:prstGeom prst="rightBrace">
+            <a:avLst>
+              <a:gd name="adj1" fmla="val 8333"/>
+              <a:gd name="adj2" fmla="val 50363"/>
+            </a:avLst>
+          </a:prstGeom>
+        </p:spPr>
+        <p:style>
+          <a:lnRef idx="1">
+            <a:schemeClr val="dk1"/>
+          </a:lnRef>
+          <a:fillRef idx="0">
+            <a:schemeClr val="dk1"/>
+          </a:fillRef>
+          <a:effectRef idx="0">
+            <a:schemeClr val="dk1"/>
+          </a:effectRef>
+          <a:fontRef idx="minor">
+            <a:schemeClr val="tx1"/>
+          </a:fontRef>
+        </p:style>
+        <p:txBody>
+          <a:bodyPr rtlCol="0" anchor="ctr"/>
+          <a:lstStyle/>
+          <a:p>
+            <a:pPr algn="ctr"/>
+            <a:endParaRPr lang="de-DE">
+              <a:latin typeface="Arial" panose="020B0604020202020204" pitchFamily="34" charset="0"/>
+              <a:cs typeface="Arial" panose="020B0604020202020204" pitchFamily="34" charset="0"/>
+            </a:endParaRPr>
+          </a:p>
+        </p:txBody>
+      </p:sp>
+      <p:sp>
+        <p:nvSpPr>
+          <p:cNvPr id="72" name="Textfeld 71"/>
+          <p:cNvSpPr txBox="1"/>
+          <p:nvPr/>
+        </p:nvSpPr>
+        <p:spPr>
+          <a:xfrm>
+            <a:off x="9201900" y="2583065"/>
+            <a:ext cx="2463711" cy="707886"/>
+          </a:xfrm>
+          <a:prstGeom prst="rect">
+            <a:avLst/>
+          </a:prstGeom>
+          <a:noFill/>
+        </p:spPr>
+        <p:txBody>
+          <a:bodyPr wrap="square" rtlCol="0">
+            <a:spAutoFit/>
+          </a:bodyPr>
+          <a:lstStyle/>
+          <a:p>
+            <a:r>
+              <a:rPr lang="de-DE" sz="2000" dirty="0" smtClean="0">
+                <a:latin typeface="Arial" panose="020B0604020202020204" pitchFamily="34" charset="0"/>
+                <a:cs typeface="Arial" panose="020B0604020202020204" pitchFamily="34" charset="0"/>
+              </a:rPr>
+              <a:t>Differentiation between bit 1</a:t>
+            </a:r>
+            <a:endParaRPr lang="de-DE" sz="2000" dirty="0">
+              <a:latin typeface="Arial" panose="020B0604020202020204" pitchFamily="34" charset="0"/>
+              <a:cs typeface="Arial" panose="020B0604020202020204" pitchFamily="34" charset="0"/>
+            </a:endParaRPr>
+          </a:p>
+        </p:txBody>
+      </p:sp>
+      <p:sp>
+        <p:nvSpPr>
+          <p:cNvPr id="73" name="Geschweifte Klammer rechts 72"/>
+          <p:cNvSpPr/>
+          <p:nvPr/>
+        </p:nvSpPr>
+        <p:spPr>
+          <a:xfrm rot="5400000">
+            <a:off x="5893195" y="-242210"/>
+            <a:ext cx="442810" cy="4338000"/>
+          </a:xfrm>
+          <a:prstGeom prst="rightBrace">
+            <a:avLst>
+              <a:gd name="adj1" fmla="val 8333"/>
+              <a:gd name="adj2" fmla="val 50363"/>
+            </a:avLst>
+          </a:prstGeom>
+        </p:spPr>
+        <p:style>
+          <a:lnRef idx="1">
+            <a:schemeClr val="dk1"/>
+          </a:lnRef>
+          <a:fillRef idx="0">
+            <a:schemeClr val="dk1"/>
+          </a:fillRef>
+          <a:effectRef idx="0">
+            <a:schemeClr val="dk1"/>
+          </a:effectRef>
+          <a:fontRef idx="minor">
+            <a:schemeClr val="tx1"/>
+          </a:fontRef>
+        </p:style>
+        <p:txBody>
+          <a:bodyPr rtlCol="0" anchor="ctr"/>
+          <a:lstStyle/>
+          <a:p>
+            <a:pPr algn="ctr"/>
+            <a:endParaRPr lang="de-DE">
+              <a:latin typeface="Arial" panose="020B0604020202020204" pitchFamily="34" charset="0"/>
+              <a:cs typeface="Arial" panose="020B0604020202020204" pitchFamily="34" charset="0"/>
+            </a:endParaRPr>
+          </a:p>
+        </p:txBody>
+      </p:sp>
+      <p:sp>
+        <p:nvSpPr>
+          <p:cNvPr id="74" name="Rechteck 73"/>
+          <p:cNvSpPr/>
+          <p:nvPr/>
+        </p:nvSpPr>
+        <p:spPr>
+          <a:xfrm>
+            <a:off x="6183559" y="1974001"/>
+            <a:ext cx="1990326" cy="707886"/>
+          </a:xfrm>
+          <a:prstGeom prst="rect">
+            <a:avLst/>
+          </a:prstGeom>
+        </p:spPr>
+        <p:txBody>
+          <a:bodyPr wrap="square">
+            <a:spAutoFit/>
+          </a:bodyPr>
+          <a:lstStyle/>
+          <a:p>
+            <a:r>
+              <a:rPr lang="de-DE" sz="2000" dirty="0">
+                <a:latin typeface="Arial" panose="020B0604020202020204" pitchFamily="34" charset="0"/>
+                <a:cs typeface="Arial" panose="020B0604020202020204" pitchFamily="34" charset="0"/>
+              </a:rPr>
+              <a:t>Differentiation between bit 2</a:t>
+            </a:r>
+          </a:p>
+        </p:txBody>
+      </p:sp>
+      <p:sp>
+        <p:nvSpPr>
+          <p:cNvPr id="75" name="Textfeld 74"/>
+          <p:cNvSpPr txBox="1"/>
+          <p:nvPr/>
+        </p:nvSpPr>
+        <p:spPr>
+          <a:xfrm>
+            <a:off x="8117511" y="2889303"/>
+            <a:ext cx="316226" cy="400110"/>
+          </a:xfrm>
+          <a:prstGeom prst="rect">
+            <a:avLst/>
+          </a:prstGeom>
+          <a:noFill/>
+        </p:spPr>
+        <p:txBody>
+          <a:bodyPr wrap="square" rtlCol="0">
+            <a:spAutoFit/>
+          </a:bodyPr>
+          <a:lstStyle/>
+          <a:p>
+            <a:r>
+              <a:rPr lang="de-DE" sz="2000" dirty="0" smtClean="0">
+                <a:latin typeface="Arial" panose="020B0604020202020204" pitchFamily="34" charset="0"/>
+                <a:cs typeface="Arial" panose="020B0604020202020204" pitchFamily="34" charset="0"/>
+              </a:rPr>
+              <a:t>1</a:t>
+            </a:r>
+            <a:endParaRPr lang="de-DE" sz="2000" dirty="0">
+              <a:latin typeface="Arial" panose="020B0604020202020204" pitchFamily="34" charset="0"/>
+              <a:cs typeface="Arial" panose="020B0604020202020204" pitchFamily="34" charset="0"/>
+            </a:endParaRPr>
+          </a:p>
+        </p:txBody>
+      </p:sp>
+      <p:sp>
+        <p:nvSpPr>
+          <p:cNvPr id="76" name="Textfeld 75"/>
+          <p:cNvSpPr txBox="1"/>
+          <p:nvPr/>
+        </p:nvSpPr>
+        <p:spPr>
+          <a:xfrm>
+            <a:off x="6237027" y="1072568"/>
+            <a:ext cx="316226" cy="400110"/>
+          </a:xfrm>
+          <a:prstGeom prst="rect">
+            <a:avLst/>
+          </a:prstGeom>
+          <a:noFill/>
+        </p:spPr>
+        <p:txBody>
+          <a:bodyPr wrap="square" rtlCol="0">
+            <a:spAutoFit/>
+          </a:bodyPr>
+          <a:lstStyle/>
+          <a:p>
+            <a:r>
+              <a:rPr lang="de-DE" sz="2000" dirty="0" smtClean="0">
+                <a:latin typeface="Arial" panose="020B0604020202020204" pitchFamily="34" charset="0"/>
+                <a:cs typeface="Arial" panose="020B0604020202020204" pitchFamily="34" charset="0"/>
+              </a:rPr>
+              <a:t>1</a:t>
+            </a:r>
+            <a:endParaRPr lang="de-DE" sz="2000" dirty="0">
+              <a:latin typeface="Arial" panose="020B0604020202020204" pitchFamily="34" charset="0"/>
+              <a:cs typeface="Arial" panose="020B0604020202020204" pitchFamily="34" charset="0"/>
+            </a:endParaRPr>
+          </a:p>
+        </p:txBody>
+      </p:sp>
+      <p:sp>
+        <p:nvSpPr>
+          <p:cNvPr id="77" name="Textfeld 76"/>
+          <p:cNvSpPr txBox="1"/>
+          <p:nvPr/>
+        </p:nvSpPr>
+        <p:spPr>
+          <a:xfrm>
+            <a:off x="6253743" y="5377890"/>
+            <a:ext cx="448586" cy="400110"/>
+          </a:xfrm>
+          <a:prstGeom prst="rect">
+            <a:avLst/>
+          </a:prstGeom>
+          <a:noFill/>
+        </p:spPr>
+        <p:txBody>
+          <a:bodyPr wrap="square" rtlCol="0">
+            <a:spAutoFit/>
+          </a:bodyPr>
+          <a:lstStyle/>
+          <a:p>
+            <a:r>
+              <a:rPr lang="de-DE" sz="2000" dirty="0" smtClean="0">
+                <a:latin typeface="Arial" panose="020B0604020202020204" pitchFamily="34" charset="0"/>
+                <a:cs typeface="Arial" panose="020B0604020202020204" pitchFamily="34" charset="0"/>
+              </a:rPr>
+              <a:t>-1</a:t>
+            </a:r>
+            <a:endParaRPr lang="de-DE" sz="2000" dirty="0">
+              <a:latin typeface="Arial" panose="020B0604020202020204" pitchFamily="34" charset="0"/>
+              <a:cs typeface="Arial" panose="020B0604020202020204" pitchFamily="34" charset="0"/>
+            </a:endParaRPr>
+          </a:p>
+        </p:txBody>
+      </p:sp>
+      <p:sp>
+        <p:nvSpPr>
+          <p:cNvPr id="78" name="Textfeld 77"/>
+          <p:cNvSpPr txBox="1"/>
+          <p:nvPr/>
+        </p:nvSpPr>
+        <p:spPr>
+          <a:xfrm>
+            <a:off x="3711851" y="2884177"/>
+            <a:ext cx="448586" cy="400110"/>
+          </a:xfrm>
+          <a:prstGeom prst="rect">
+            <a:avLst/>
+          </a:prstGeom>
+          <a:noFill/>
+        </p:spPr>
+        <p:txBody>
+          <a:bodyPr wrap="square" rtlCol="0">
+            <a:spAutoFit/>
+          </a:bodyPr>
+          <a:lstStyle/>
+          <a:p>
+            <a:r>
+              <a:rPr lang="de-DE" sz="2000" dirty="0" smtClean="0">
+                <a:latin typeface="Arial" panose="020B0604020202020204" pitchFamily="34" charset="0"/>
+                <a:cs typeface="Arial" panose="020B0604020202020204" pitchFamily="34" charset="0"/>
+              </a:rPr>
+              <a:t>-1</a:t>
+            </a:r>
+            <a:endParaRPr lang="de-DE" sz="2000" dirty="0">
+              <a:latin typeface="Arial" panose="020B0604020202020204" pitchFamily="34" charset="0"/>
+              <a:cs typeface="Arial" panose="020B0604020202020204" pitchFamily="34" charset="0"/>
+            </a:endParaRPr>
+          </a:p>
+        </p:txBody>
+      </p:sp>
+      <p:sp>
+        <p:nvSpPr>
+          <p:cNvPr id="81" name="Rechteck 80"/>
+          <p:cNvSpPr/>
+          <p:nvPr/>
+        </p:nvSpPr>
+        <p:spPr>
+          <a:xfrm>
+            <a:off x="7842473" y="6132776"/>
+            <a:ext cx="1247457" cy="400110"/>
+          </a:xfrm>
+          <a:prstGeom prst="rect">
+            <a:avLst/>
+          </a:prstGeom>
+        </p:spPr>
+        <p:txBody>
+          <a:bodyPr wrap="none">
+            <a:spAutoFit/>
+          </a:bodyPr>
+          <a:lstStyle/>
+          <a:p>
+            <a:r>
+              <a:rPr lang="de-DE" sz="2000" dirty="0">
+                <a:latin typeface="Arial" panose="020B0604020202020204" pitchFamily="34" charset="0"/>
+                <a:cs typeface="Arial" panose="020B0604020202020204" pitchFamily="34" charset="0"/>
+              </a:rPr>
+              <a:t>Bit </a:t>
+            </a:r>
+            <a:r>
+              <a:rPr lang="de-DE" sz="2000" dirty="0" smtClean="0">
+                <a:latin typeface="Arial" panose="020B0604020202020204" pitchFamily="34" charset="0"/>
+                <a:cs typeface="Arial" panose="020B0604020202020204" pitchFamily="34" charset="0"/>
+              </a:rPr>
+              <a:t>X</a:t>
+            </a:r>
+            <a:r>
+              <a:rPr lang="de-DE" sz="2000" baseline="-25000" dirty="0" smtClean="0">
+                <a:latin typeface="Arial" panose="020B0604020202020204" pitchFamily="34" charset="0"/>
+                <a:cs typeface="Arial" panose="020B0604020202020204" pitchFamily="34" charset="0"/>
+              </a:rPr>
+              <a:t>2</a:t>
+            </a:r>
+            <a:r>
+              <a:rPr lang="de-DE" sz="2000" dirty="0" smtClean="0">
+                <a:latin typeface="Arial" panose="020B0604020202020204" pitchFamily="34" charset="0"/>
+                <a:cs typeface="Arial" panose="020B0604020202020204" pitchFamily="34" charset="0"/>
+              </a:rPr>
+              <a:t>: 01</a:t>
+            </a:r>
+            <a:endParaRPr lang="de-DE" sz="2000" dirty="0">
+              <a:latin typeface="Arial" panose="020B0604020202020204" pitchFamily="34" charset="0"/>
+              <a:cs typeface="Arial" panose="020B0604020202020204" pitchFamily="34" charset="0"/>
+            </a:endParaRPr>
+          </a:p>
+        </p:txBody>
+      </p:sp>
+      <p:cxnSp>
+        <p:nvCxnSpPr>
+          <p:cNvPr id="82" name="Gerader Verbinder 81"/>
+          <p:cNvCxnSpPr/>
+          <p:nvPr/>
+        </p:nvCxnSpPr>
+        <p:spPr>
+          <a:xfrm>
+            <a:off x="7336861" y="3452199"/>
+            <a:ext cx="1759563" cy="1337"/>
+          </a:xfrm>
+          <a:prstGeom prst="line">
+            <a:avLst/>
+          </a:prstGeom>
+          <a:ln w="57150">
+            <a:solidFill>
+              <a:srgbClr val="00B050"/>
+            </a:solidFill>
+            <a:prstDash val="dash"/>
+          </a:ln>
+        </p:spPr>
+        <p:style>
+          <a:lnRef idx="1">
+            <a:schemeClr val="accent1"/>
+          </a:lnRef>
+          <a:fillRef idx="0">
+            <a:schemeClr val="accent1"/>
+          </a:fillRef>
+          <a:effectRef idx="0">
+            <a:schemeClr val="accent1"/>
+          </a:effectRef>
+          <a:fontRef idx="minor">
+            <a:schemeClr val="tx1"/>
+          </a:fontRef>
+        </p:style>
+      </p:cxnSp>
+      <p:sp>
+        <p:nvSpPr>
+          <p:cNvPr id="85" name="Rechteck 84"/>
+          <p:cNvSpPr/>
+          <p:nvPr/>
+        </p:nvSpPr>
+        <p:spPr>
+          <a:xfrm>
+            <a:off x="6672450" y="3597160"/>
+            <a:ext cx="2310248" cy="400110"/>
+          </a:xfrm>
+          <a:prstGeom prst="rect">
+            <a:avLst/>
+          </a:prstGeom>
+        </p:spPr>
+        <p:txBody>
+          <a:bodyPr wrap="none">
+            <a:spAutoFit/>
+          </a:bodyPr>
+          <a:lstStyle/>
+          <a:p>
+            <a:r>
+              <a:rPr lang="de-DE" sz="2000" dirty="0" smtClean="0">
+                <a:solidFill>
+                  <a:srgbClr val="00B050"/>
+                </a:solidFill>
+                <a:latin typeface="Arial" panose="020B0604020202020204" pitchFamily="34" charset="0"/>
+                <a:cs typeface="Arial" panose="020B0604020202020204" pitchFamily="34" charset="0"/>
+              </a:rPr>
+              <a:t>Decision boundary</a:t>
+            </a:r>
+            <a:endParaRPr lang="de-DE" sz="2000" dirty="0">
+              <a:solidFill>
+                <a:srgbClr val="00B050"/>
+              </a:solidFill>
+              <a:latin typeface="Arial" panose="020B0604020202020204" pitchFamily="34" charset="0"/>
+              <a:cs typeface="Arial" panose="020B0604020202020204" pitchFamily="34" charset="0"/>
+            </a:endParaRPr>
+          </a:p>
+        </p:txBody>
+      </p:sp>
+      <p:cxnSp>
+        <p:nvCxnSpPr>
+          <p:cNvPr id="80" name="Gerader Verbinder 79"/>
+          <p:cNvCxnSpPr/>
+          <p:nvPr/>
+        </p:nvCxnSpPr>
+        <p:spPr>
+          <a:xfrm>
+            <a:off x="6100549" y="710768"/>
+            <a:ext cx="0" cy="1909564"/>
+          </a:xfrm>
+          <a:prstGeom prst="line">
+            <a:avLst/>
+          </a:prstGeom>
+          <a:ln w="57150">
+            <a:solidFill>
+              <a:srgbClr val="00B050"/>
+            </a:solidFill>
+            <a:prstDash val="dash"/>
+          </a:ln>
+        </p:spPr>
+        <p:style>
+          <a:lnRef idx="1">
+            <a:schemeClr val="accent1"/>
+          </a:lnRef>
+          <a:fillRef idx="0">
+            <a:schemeClr val="accent1"/>
+          </a:fillRef>
+          <a:effectRef idx="0">
+            <a:schemeClr val="accent1"/>
+          </a:effectRef>
+          <a:fontRef idx="minor">
+            <a:schemeClr val="tx1"/>
+          </a:fontRef>
+        </p:style>
+      </p:cxnSp>
+    </p:spTree>
+    <p:extLst>
+      <p:ext uri="{BB962C8B-B14F-4D97-AF65-F5344CB8AC3E}">
+        <p14:creationId xmlns:p14="http://schemas.microsoft.com/office/powerpoint/2010/main" val="3475699869"/>
+      </p:ext>
+    </p:extLst>
+  </p:cSld>
+  <p:clrMapOvr>
+    <a:masterClrMapping/>
+  </p:clrMapOvr>
+</p:sld>
+</file>
+
+<file path=ppt/slides/slide4.xml><?xml version="1.0" encoding="utf-8"?>
+<p:sld xmlns:a="http://schemas.openxmlformats.org/drawingml/2006/main" xmlns:r="http://schemas.openxmlformats.org/officeDocument/2006/relationships" xmlns:p="http://schemas.openxmlformats.org/presentationml/2006/main">
+  <p:cSld>
+    <p:spTree>
+      <p:nvGrpSpPr>
+        <p:cNvPr id="1" name=""/>
+        <p:cNvGrpSpPr/>
+        <p:nvPr/>
+      </p:nvGrpSpPr>
+      <p:grpSpPr>
+        <a:xfrm>
+          <a:off x="0" y="0"/>
+          <a:ext cx="0" cy="0"/>
+          <a:chOff x="0" y="0"/>
+          <a:chExt cx="0" cy="0"/>
+        </a:xfrm>
+      </p:grpSpPr>
+      <p:sp>
+        <p:nvSpPr>
+          <p:cNvPr id="5" name="Rechteck 4"/>
+          <p:cNvSpPr/>
+          <p:nvPr/>
+        </p:nvSpPr>
+        <p:spPr>
+          <a:xfrm>
+            <a:off x="4224270" y="301581"/>
+            <a:ext cx="1790164" cy="965915"/>
+          </a:xfrm>
+          <a:prstGeom prst="rect">
+            <a:avLst/>
+          </a:prstGeom>
+        </p:spPr>
+        <p:style>
+          <a:lnRef idx="2">
+            <a:schemeClr val="dk1"/>
+          </a:lnRef>
+          <a:fillRef idx="1">
+            <a:schemeClr val="lt1"/>
+          </a:fillRef>
+          <a:effectRef idx="0">
+            <a:schemeClr val="dk1"/>
+          </a:effectRef>
+          <a:fontRef idx="minor">
+            <a:schemeClr val="dk1"/>
+          </a:fontRef>
+        </p:style>
+        <p:txBody>
+          <a:bodyPr rtlCol="0" anchor="ctr"/>
+          <a:lstStyle/>
+          <a:p>
+            <a:pPr algn="ctr"/>
+            <a:r>
+              <a:rPr lang="de-DE" dirty="0" smtClean="0"/>
+              <a:t>Set </a:t>
+            </a:r>
+            <a:r>
+              <a:rPr lang="de-DE" dirty="0" err="1" smtClean="0"/>
+              <a:t>values</a:t>
+            </a:r>
+            <a:r>
+              <a:rPr lang="de-DE" dirty="0" smtClean="0"/>
+              <a:t> </a:t>
+            </a:r>
+            <a:r>
+              <a:rPr lang="de-DE" dirty="0" err="1" smtClean="0"/>
+              <a:t>for</a:t>
+            </a:r>
+            <a:r>
+              <a:rPr lang="de-DE" dirty="0" smtClean="0"/>
+              <a:t> </a:t>
+            </a:r>
+            <a:r>
+              <a:rPr lang="de-DE" dirty="0" err="1" smtClean="0"/>
+              <a:t>codelength</a:t>
+            </a:r>
+            <a:r>
+              <a:rPr lang="de-DE" dirty="0" smtClean="0"/>
+              <a:t>, SNR-range</a:t>
+            </a:r>
+            <a:endParaRPr lang="de-DE" dirty="0"/>
+          </a:p>
+        </p:txBody>
+      </p:sp>
+      <p:sp>
+        <p:nvSpPr>
+          <p:cNvPr id="6" name="Rechteck 5"/>
+          <p:cNvSpPr/>
+          <p:nvPr/>
+        </p:nvSpPr>
+        <p:spPr>
+          <a:xfrm>
+            <a:off x="4217830" y="1868510"/>
+            <a:ext cx="1790164" cy="965915"/>
+          </a:xfrm>
+          <a:prstGeom prst="rect">
+            <a:avLst/>
+          </a:prstGeom>
+        </p:spPr>
+        <p:style>
+          <a:lnRef idx="2">
+            <a:schemeClr val="dk1"/>
+          </a:lnRef>
+          <a:fillRef idx="1">
+            <a:schemeClr val="lt1"/>
+          </a:fillRef>
+          <a:effectRef idx="0">
+            <a:schemeClr val="dk1"/>
+          </a:effectRef>
+          <a:fontRef idx="minor">
+            <a:schemeClr val="dk1"/>
+          </a:fontRef>
+        </p:style>
+        <p:txBody>
+          <a:bodyPr rtlCol="0" anchor="ctr"/>
+          <a:lstStyle/>
+          <a:p>
+            <a:pPr algn="ctr"/>
+            <a:r>
+              <a:rPr lang="de-DE" dirty="0" err="1"/>
+              <a:t>r</a:t>
+            </a:r>
+            <a:r>
+              <a:rPr lang="de-DE" dirty="0" err="1" smtClean="0"/>
+              <a:t>andom</a:t>
+            </a:r>
+            <a:r>
+              <a:rPr lang="de-DE" dirty="0" smtClean="0"/>
+              <a:t> </a:t>
+            </a:r>
+            <a:r>
+              <a:rPr lang="de-DE" dirty="0" err="1" smtClean="0"/>
+              <a:t>bit</a:t>
+            </a:r>
+            <a:r>
+              <a:rPr lang="de-DE" dirty="0" smtClean="0"/>
+              <a:t> </a:t>
+            </a:r>
+            <a:r>
+              <a:rPr lang="de-DE" dirty="0" err="1" smtClean="0"/>
+              <a:t>generation</a:t>
+            </a:r>
+            <a:endParaRPr lang="de-DE" dirty="0"/>
+          </a:p>
+        </p:txBody>
+      </p:sp>
+      <p:sp>
+        <p:nvSpPr>
+          <p:cNvPr id="7" name="Rechteck 6"/>
+          <p:cNvSpPr/>
+          <p:nvPr/>
+        </p:nvSpPr>
+        <p:spPr>
+          <a:xfrm>
+            <a:off x="4224270" y="3202547"/>
+            <a:ext cx="1790164" cy="965915"/>
+          </a:xfrm>
+          <a:prstGeom prst="rect">
+            <a:avLst/>
+          </a:prstGeom>
+        </p:spPr>
+        <p:style>
+          <a:lnRef idx="2">
+            <a:schemeClr val="dk1"/>
+          </a:lnRef>
+          <a:fillRef idx="1">
+            <a:schemeClr val="lt1"/>
+          </a:fillRef>
+          <a:effectRef idx="0">
+            <a:schemeClr val="dk1"/>
+          </a:effectRef>
+          <a:fontRef idx="minor">
+            <a:schemeClr val="dk1"/>
+          </a:fontRef>
+        </p:style>
+        <p:txBody>
+          <a:bodyPr rtlCol="0" anchor="ctr"/>
+          <a:lstStyle/>
+          <a:p>
+            <a:pPr algn="ctr"/>
+            <a:r>
+              <a:rPr lang="de-DE" dirty="0" err="1" smtClean="0"/>
+              <a:t>modulation</a:t>
+            </a:r>
+            <a:endParaRPr lang="de-DE" dirty="0"/>
+          </a:p>
+        </p:txBody>
+      </p:sp>
+      <p:sp>
+        <p:nvSpPr>
+          <p:cNvPr id="8" name="Rechteck 7"/>
+          <p:cNvSpPr/>
+          <p:nvPr/>
+        </p:nvSpPr>
+        <p:spPr>
+          <a:xfrm>
+            <a:off x="4224270" y="4543560"/>
+            <a:ext cx="1790164" cy="965915"/>
+          </a:xfrm>
+          <a:prstGeom prst="rect">
+            <a:avLst/>
+          </a:prstGeom>
+        </p:spPr>
+        <p:style>
+          <a:lnRef idx="2">
+            <a:schemeClr val="dk1"/>
+          </a:lnRef>
+          <a:fillRef idx="1">
+            <a:schemeClr val="lt1"/>
+          </a:fillRef>
+          <a:effectRef idx="0">
+            <a:schemeClr val="dk1"/>
+          </a:effectRef>
+          <a:fontRef idx="minor">
+            <a:schemeClr val="dk1"/>
+          </a:fontRef>
+        </p:style>
+        <p:txBody>
+          <a:bodyPr rtlCol="0" anchor="ctr"/>
+          <a:lstStyle/>
+          <a:p>
+            <a:pPr algn="ctr"/>
+            <a:r>
+              <a:rPr lang="de-DE" dirty="0" smtClean="0"/>
+              <a:t>I(X;Y) = h(Y) – h(N) </a:t>
+            </a:r>
+            <a:endParaRPr lang="de-DE" dirty="0"/>
+          </a:p>
+        </p:txBody>
+      </p:sp>
+      <p:cxnSp>
+        <p:nvCxnSpPr>
+          <p:cNvPr id="10" name="Gerade Verbindung mit Pfeil 9"/>
+          <p:cNvCxnSpPr>
+            <a:stCxn id="5" idx="2"/>
+            <a:endCxn id="6" idx="0"/>
+          </p:cNvCxnSpPr>
+          <p:nvPr/>
+        </p:nvCxnSpPr>
+        <p:spPr>
+          <a:xfrm flipH="1">
+            <a:off x="5112912" y="1267496"/>
+            <a:ext cx="6440" cy="601014"/>
+          </a:xfrm>
+          <a:prstGeom prst="straightConnector1">
+            <a:avLst/>
+          </a:prstGeom>
+          <a:ln>
+            <a:tailEnd type="triangle"/>
+          </a:ln>
+        </p:spPr>
+        <p:style>
+          <a:lnRef idx="1">
+            <a:schemeClr val="accent1"/>
+          </a:lnRef>
+          <a:fillRef idx="0">
+            <a:schemeClr val="accent1"/>
+          </a:fillRef>
+          <a:effectRef idx="0">
+            <a:schemeClr val="accent1"/>
+          </a:effectRef>
+          <a:fontRef idx="minor">
+            <a:schemeClr val="tx1"/>
+          </a:fontRef>
+        </p:style>
+      </p:cxnSp>
+      <p:cxnSp>
+        <p:nvCxnSpPr>
+          <p:cNvPr id="13" name="Gerade Verbindung mit Pfeil 12"/>
+          <p:cNvCxnSpPr>
+            <a:stCxn id="6" idx="2"/>
+            <a:endCxn id="7" idx="0"/>
+          </p:cNvCxnSpPr>
+          <p:nvPr/>
+        </p:nvCxnSpPr>
+        <p:spPr>
+          <a:xfrm>
+            <a:off x="5112912" y="2834425"/>
+            <a:ext cx="6440" cy="368122"/>
+          </a:xfrm>
+          <a:prstGeom prst="straightConnector1">
+            <a:avLst/>
+          </a:prstGeom>
+          <a:ln>
+            <a:tailEnd type="triangle"/>
+          </a:ln>
+        </p:spPr>
+        <p:style>
+          <a:lnRef idx="1">
+            <a:schemeClr val="accent1"/>
+          </a:lnRef>
+          <a:fillRef idx="0">
+            <a:schemeClr val="accent1"/>
+          </a:fillRef>
+          <a:effectRef idx="0">
+            <a:schemeClr val="accent1"/>
+          </a:effectRef>
+          <a:fontRef idx="minor">
+            <a:schemeClr val="tx1"/>
+          </a:fontRef>
+        </p:style>
+      </p:cxnSp>
+      <p:cxnSp>
+        <p:nvCxnSpPr>
+          <p:cNvPr id="15" name="Gerade Verbindung mit Pfeil 14"/>
+          <p:cNvCxnSpPr>
+            <a:stCxn id="7" idx="2"/>
+            <a:endCxn id="8" idx="0"/>
+          </p:cNvCxnSpPr>
+          <p:nvPr/>
+        </p:nvCxnSpPr>
+        <p:spPr>
+          <a:xfrm>
+            <a:off x="5119352" y="4168462"/>
+            <a:ext cx="0" cy="375098"/>
+          </a:xfrm>
+          <a:prstGeom prst="straightConnector1">
+            <a:avLst/>
+          </a:prstGeom>
+          <a:ln>
+            <a:tailEnd type="triangle"/>
+          </a:ln>
+        </p:spPr>
+        <p:style>
+          <a:lnRef idx="1">
+            <a:schemeClr val="accent1"/>
+          </a:lnRef>
+          <a:fillRef idx="0">
+            <a:schemeClr val="accent1"/>
+          </a:fillRef>
+          <a:effectRef idx="0">
+            <a:schemeClr val="accent1"/>
+          </a:effectRef>
+          <a:fontRef idx="minor">
+            <a:schemeClr val="tx1"/>
+          </a:fontRef>
+        </p:style>
+      </p:cxnSp>
+      <p:cxnSp>
+        <p:nvCxnSpPr>
+          <p:cNvPr id="21" name="Gewinkelte Verbindung 20"/>
+          <p:cNvCxnSpPr>
+            <a:stCxn id="8" idx="3"/>
+          </p:cNvCxnSpPr>
+          <p:nvPr/>
+        </p:nvCxnSpPr>
+        <p:spPr>
+          <a:xfrm flipV="1">
+            <a:off x="6014434" y="1568003"/>
+            <a:ext cx="927279" cy="3458515"/>
+          </a:xfrm>
+          <a:prstGeom prst="bentConnector2">
+            <a:avLst/>
+          </a:prstGeom>
+        </p:spPr>
+        <p:style>
+          <a:lnRef idx="1">
+            <a:schemeClr val="accent1"/>
+          </a:lnRef>
+          <a:fillRef idx="0">
+            <a:schemeClr val="accent1"/>
+          </a:fillRef>
+          <a:effectRef idx="0">
+            <a:schemeClr val="accent1"/>
+          </a:effectRef>
+          <a:fontRef idx="minor">
+            <a:schemeClr val="tx1"/>
+          </a:fontRef>
+        </p:style>
+      </p:cxnSp>
+      <p:cxnSp>
+        <p:nvCxnSpPr>
+          <p:cNvPr id="23" name="Gerade Verbindung mit Pfeil 22"/>
+          <p:cNvCxnSpPr/>
+          <p:nvPr/>
+        </p:nvCxnSpPr>
+        <p:spPr>
+          <a:xfrm flipH="1">
+            <a:off x="5119352" y="1568003"/>
+            <a:ext cx="1822361" cy="0"/>
+          </a:xfrm>
+          <a:prstGeom prst="straightConnector1">
+            <a:avLst/>
+          </a:prstGeom>
+          <a:ln>
+            <a:tailEnd type="triangle"/>
+          </a:ln>
+        </p:spPr>
+        <p:style>
+          <a:lnRef idx="1">
+            <a:schemeClr val="accent1"/>
+          </a:lnRef>
+          <a:fillRef idx="0">
+            <a:schemeClr val="accent1"/>
+          </a:fillRef>
+          <a:effectRef idx="0">
+            <a:schemeClr val="accent1"/>
+          </a:effectRef>
+          <a:fontRef idx="minor">
+            <a:schemeClr val="tx1"/>
+          </a:fontRef>
+        </p:style>
+      </p:cxnSp>
+      <p:sp>
+        <p:nvSpPr>
+          <p:cNvPr id="24" name="Textfeld 23"/>
+          <p:cNvSpPr txBox="1"/>
+          <p:nvPr/>
+        </p:nvSpPr>
+        <p:spPr>
+          <a:xfrm>
+            <a:off x="6948153" y="3018486"/>
+            <a:ext cx="2640169" cy="369332"/>
+          </a:xfrm>
+          <a:prstGeom prst="rect">
+            <a:avLst/>
+          </a:prstGeom>
+          <a:noFill/>
+        </p:spPr>
+        <p:txBody>
+          <a:bodyPr wrap="square" rtlCol="0">
+            <a:spAutoFit/>
+          </a:bodyPr>
+          <a:lstStyle/>
+          <a:p>
+            <a:r>
+              <a:rPr lang="de-DE" dirty="0" smtClean="0"/>
+              <a:t>snr_min:stepsize:snr_max</a:t>
+            </a:r>
+            <a:endParaRPr lang="de-DE" dirty="0"/>
+          </a:p>
+        </p:txBody>
+      </p:sp>
+    </p:spTree>
+    <p:extLst>
+      <p:ext uri="{BB962C8B-B14F-4D97-AF65-F5344CB8AC3E}">
+        <p14:creationId xmlns:p14="http://schemas.microsoft.com/office/powerpoint/2010/main" val="2989215023"/>
+      </p:ext>
+    </p:extLst>
+  </p:cSld>
+  <p:clrMapOvr>
+    <a:masterClrMapping/>
+  </p:clrMapOvr>
+</p:sld>
+</file>
+
+<file path=ppt/slides/slide5.xml><?xml version="1.0" encoding="utf-8"?>
+<p:sld xmlns:a="http://schemas.openxmlformats.org/drawingml/2006/main" xmlns:r="http://schemas.openxmlformats.org/officeDocument/2006/relationships" xmlns:p="http://schemas.openxmlformats.org/presentationml/2006/main">
+  <p:cSld>
+    <p:spTree>
+      <p:nvGrpSpPr>
+        <p:cNvPr id="1" name=""/>
+        <p:cNvGrpSpPr/>
+        <p:nvPr/>
+      </p:nvGrpSpPr>
+      <p:grpSpPr>
+        <a:xfrm>
+          <a:off x="0" y="0"/>
+          <a:ext cx="0" cy="0"/>
+          <a:chOff x="0" y="0"/>
+          <a:chExt cx="0" cy="0"/>
+        </a:xfrm>
+      </p:grpSpPr>
+      <p:sp>
+        <p:nvSpPr>
+          <p:cNvPr id="7" name="Rechteck 6"/>
+          <p:cNvSpPr/>
+          <p:nvPr/>
+        </p:nvSpPr>
+        <p:spPr>
+          <a:xfrm rot="16200000">
+            <a:off x="7675808" y="518984"/>
+            <a:ext cx="3755221" cy="4411360"/>
+          </a:xfrm>
+          <a:prstGeom prst="rect">
+            <a:avLst/>
+          </a:prstGeom>
+          <a:ln>
+            <a:prstDash val="dash"/>
+          </a:ln>
+        </p:spPr>
+        <p:style>
+          <a:lnRef idx="2">
+            <a:schemeClr val="dk1"/>
+          </a:lnRef>
+          <a:fillRef idx="1">
+            <a:schemeClr val="lt1"/>
+          </a:fillRef>
+          <a:effectRef idx="0">
+            <a:schemeClr val="dk1"/>
+          </a:effectRef>
+          <a:fontRef idx="minor">
+            <a:schemeClr val="dk1"/>
+          </a:fontRef>
+        </p:style>
+        <p:txBody>
+          <a:bodyPr rtlCol="0" anchor="ctr"/>
+          <a:lstStyle/>
+          <a:p>
+            <a:pPr algn="ctr"/>
+            <a:endParaRPr lang="de-DE"/>
+          </a:p>
+        </p:txBody>
+      </p:sp>
+      <p:sp>
+        <p:nvSpPr>
+          <p:cNvPr id="8" name="Flussdiagramm: Zusammenführung 7"/>
+          <p:cNvSpPr/>
+          <p:nvPr/>
+        </p:nvSpPr>
+        <p:spPr>
+          <a:xfrm>
+            <a:off x="8557567" y="1787609"/>
+            <a:ext cx="557599" cy="560175"/>
+          </a:xfrm>
+          <a:prstGeom prst="flowChartSummingJunction">
+            <a:avLst/>
+          </a:prstGeom>
+        </p:spPr>
+        <p:style>
+          <a:lnRef idx="2">
+            <a:schemeClr val="dk1"/>
+          </a:lnRef>
+          <a:fillRef idx="1">
+            <a:schemeClr val="lt1"/>
+          </a:fillRef>
+          <a:effectRef idx="0">
+            <a:schemeClr val="dk1"/>
+          </a:effectRef>
+          <a:fontRef idx="minor">
+            <a:schemeClr val="dk1"/>
+          </a:fontRef>
+        </p:style>
+        <p:txBody>
+          <a:bodyPr rtlCol="0" anchor="ctr"/>
+          <a:lstStyle/>
+          <a:p>
+            <a:pPr algn="ctr"/>
+            <a:endParaRPr lang="de-DE"/>
+          </a:p>
+        </p:txBody>
+      </p:sp>
+      <p:sp>
+        <p:nvSpPr>
+          <p:cNvPr id="9" name="Flussdiagramm: Oder 8"/>
+          <p:cNvSpPr/>
+          <p:nvPr/>
+        </p:nvSpPr>
+        <p:spPr>
+          <a:xfrm>
+            <a:off x="8561687" y="3118021"/>
+            <a:ext cx="557599" cy="527222"/>
+          </a:xfrm>
+          <a:prstGeom prst="flowChartOr">
+            <a:avLst/>
+          </a:prstGeom>
+        </p:spPr>
+        <p:style>
+          <a:lnRef idx="2">
+            <a:schemeClr val="dk1"/>
+          </a:lnRef>
+          <a:fillRef idx="1">
+            <a:schemeClr val="lt1"/>
+          </a:fillRef>
+          <a:effectRef idx="0">
+            <a:schemeClr val="dk1"/>
+          </a:effectRef>
+          <a:fontRef idx="minor">
+            <a:schemeClr val="dk1"/>
+          </a:fontRef>
+        </p:style>
+        <p:txBody>
+          <a:bodyPr rtlCol="0" anchor="ctr"/>
+          <a:lstStyle/>
+          <a:p>
+            <a:pPr algn="ctr"/>
+            <a:endParaRPr lang="de-DE"/>
+          </a:p>
+        </p:txBody>
+      </p:sp>
+      <p:cxnSp>
+        <p:nvCxnSpPr>
+          <p:cNvPr id="10" name="Gerade Verbindung mit Pfeil 9"/>
+          <p:cNvCxnSpPr/>
+          <p:nvPr/>
+        </p:nvCxnSpPr>
+        <p:spPr>
+          <a:xfrm flipH="1">
+            <a:off x="8836367" y="1400430"/>
+            <a:ext cx="11070" cy="387179"/>
+          </a:xfrm>
+          <a:prstGeom prst="straightConnector1">
+            <a:avLst/>
+          </a:prstGeom>
+          <a:ln>
+            <a:tailEnd type="triangle"/>
+          </a:ln>
+        </p:spPr>
+        <p:style>
+          <a:lnRef idx="1">
+            <a:schemeClr val="dk1"/>
+          </a:lnRef>
+          <a:fillRef idx="0">
+            <a:schemeClr val="dk1"/>
+          </a:fillRef>
+          <a:effectRef idx="0">
+            <a:schemeClr val="dk1"/>
+          </a:effectRef>
+          <a:fontRef idx="minor">
+            <a:schemeClr val="tx1"/>
+          </a:fontRef>
+        </p:style>
+      </p:cxnSp>
+      <p:cxnSp>
+        <p:nvCxnSpPr>
+          <p:cNvPr id="11" name="Gerader Verbinder 10"/>
+          <p:cNvCxnSpPr/>
+          <p:nvPr/>
+        </p:nvCxnSpPr>
+        <p:spPr>
+          <a:xfrm flipH="1" flipV="1">
+            <a:off x="8840487" y="3645243"/>
+            <a:ext cx="6950" cy="387176"/>
+          </a:xfrm>
+          <a:prstGeom prst="line">
+            <a:avLst/>
+          </a:prstGeom>
+        </p:spPr>
+        <p:style>
+          <a:lnRef idx="1">
+            <a:schemeClr val="dk1"/>
+          </a:lnRef>
+          <a:fillRef idx="0">
+            <a:schemeClr val="dk1"/>
+          </a:fillRef>
+          <a:effectRef idx="0">
+            <a:schemeClr val="dk1"/>
+          </a:effectRef>
+          <a:fontRef idx="minor">
+            <a:schemeClr val="tx1"/>
+          </a:fontRef>
+        </p:style>
+      </p:cxnSp>
+      <p:cxnSp>
+        <p:nvCxnSpPr>
+          <p:cNvPr id="12" name="Gerade Verbindung mit Pfeil 11"/>
+          <p:cNvCxnSpPr/>
+          <p:nvPr/>
+        </p:nvCxnSpPr>
+        <p:spPr>
+          <a:xfrm>
+            <a:off x="8836367" y="2347784"/>
+            <a:ext cx="4120" cy="770237"/>
+          </a:xfrm>
+          <a:prstGeom prst="straightConnector1">
+            <a:avLst/>
+          </a:prstGeom>
+          <a:ln>
+            <a:tailEnd type="triangle"/>
+          </a:ln>
+        </p:spPr>
+        <p:style>
+          <a:lnRef idx="1">
+            <a:schemeClr val="dk1"/>
+          </a:lnRef>
+          <a:fillRef idx="0">
+            <a:schemeClr val="dk1"/>
+          </a:fillRef>
+          <a:effectRef idx="0">
+            <a:schemeClr val="dk1"/>
+          </a:effectRef>
+          <a:fontRef idx="minor">
+            <a:schemeClr val="tx1"/>
+          </a:fontRef>
+        </p:style>
+      </p:cxnSp>
+      <p:cxnSp>
+        <p:nvCxnSpPr>
+          <p:cNvPr id="13" name="Gerade Verbindung mit Pfeil 12"/>
+          <p:cNvCxnSpPr/>
+          <p:nvPr/>
+        </p:nvCxnSpPr>
+        <p:spPr>
+          <a:xfrm flipH="1">
+            <a:off x="9115166" y="2067696"/>
+            <a:ext cx="1140942" cy="1"/>
+          </a:xfrm>
+          <a:prstGeom prst="straightConnector1">
+            <a:avLst/>
+          </a:prstGeom>
+          <a:ln>
+            <a:tailEnd type="triangle"/>
+          </a:ln>
+        </p:spPr>
+        <p:style>
+          <a:lnRef idx="1">
+            <a:schemeClr val="dk1"/>
+          </a:lnRef>
+          <a:fillRef idx="0">
+            <a:schemeClr val="dk1"/>
+          </a:fillRef>
+          <a:effectRef idx="0">
+            <a:schemeClr val="dk1"/>
+          </a:effectRef>
+          <a:fontRef idx="minor">
+            <a:schemeClr val="tx1"/>
+          </a:fontRef>
+        </p:style>
+      </p:cxnSp>
+      <p:cxnSp>
+        <p:nvCxnSpPr>
+          <p:cNvPr id="14" name="Gerade Verbindung mit Pfeil 13"/>
+          <p:cNvCxnSpPr/>
+          <p:nvPr/>
+        </p:nvCxnSpPr>
+        <p:spPr>
+          <a:xfrm flipH="1">
+            <a:off x="9119286" y="3381632"/>
+            <a:ext cx="1079158" cy="0"/>
+          </a:xfrm>
+          <a:prstGeom prst="straightConnector1">
+            <a:avLst/>
+          </a:prstGeom>
+          <a:ln>
+            <a:tailEnd type="triangle"/>
+          </a:ln>
+        </p:spPr>
+        <p:style>
+          <a:lnRef idx="1">
+            <a:schemeClr val="dk1"/>
+          </a:lnRef>
+          <a:fillRef idx="0">
+            <a:schemeClr val="dk1"/>
+          </a:fillRef>
+          <a:effectRef idx="0">
+            <a:schemeClr val="dk1"/>
+          </a:effectRef>
+          <a:fontRef idx="minor">
+            <a:schemeClr val="tx1"/>
+          </a:fontRef>
+        </p:style>
+      </p:cxnSp>
+      <p:sp>
+        <p:nvSpPr>
+          <p:cNvPr id="15" name="Textfeld 14"/>
+          <p:cNvSpPr txBox="1"/>
+          <p:nvPr/>
+        </p:nvSpPr>
+        <p:spPr>
+          <a:xfrm>
+            <a:off x="7935870" y="1031098"/>
+            <a:ext cx="291668" cy="369332"/>
+          </a:xfrm>
+          <a:prstGeom prst="rect">
+            <a:avLst/>
+          </a:prstGeom>
+          <a:noFill/>
+        </p:spPr>
+        <p:txBody>
+          <a:bodyPr wrap="square" rtlCol="0">
+            <a:spAutoFit/>
+          </a:bodyPr>
+          <a:lstStyle/>
+          <a:p>
+            <a:r>
+              <a:rPr lang="de-DE" u="sng" dirty="0"/>
+              <a:t>x</a:t>
+            </a:r>
+          </a:p>
+        </p:txBody>
+      </p:sp>
+      <p:sp>
+        <p:nvSpPr>
+          <p:cNvPr id="16" name="Textfeld 15"/>
+          <p:cNvSpPr txBox="1"/>
+          <p:nvPr/>
+        </p:nvSpPr>
+        <p:spPr>
+          <a:xfrm>
+            <a:off x="7935870" y="3663087"/>
+            <a:ext cx="291668" cy="369332"/>
+          </a:xfrm>
+          <a:prstGeom prst="rect">
+            <a:avLst/>
+          </a:prstGeom>
+          <a:noFill/>
+        </p:spPr>
+        <p:txBody>
+          <a:bodyPr wrap="square" rtlCol="0">
+            <a:spAutoFit/>
+          </a:bodyPr>
+          <a:lstStyle/>
+          <a:p>
+            <a:r>
+              <a:rPr lang="de-DE" u="sng" dirty="0"/>
+              <a:t>y</a:t>
+            </a:r>
+          </a:p>
+        </p:txBody>
+      </p:sp>
+      <p:sp>
+        <p:nvSpPr>
+          <p:cNvPr id="17" name="Rechteck 16"/>
+          <p:cNvSpPr/>
+          <p:nvPr/>
+        </p:nvSpPr>
+        <p:spPr>
+          <a:xfrm>
+            <a:off x="10218299" y="1775252"/>
+            <a:ext cx="952209" cy="584888"/>
+          </a:xfrm>
+          <a:prstGeom prst="rect">
+            <a:avLst/>
+          </a:prstGeom>
+          <a:ln>
+            <a:solidFill>
+              <a:schemeClr val="bg1"/>
+            </a:solidFill>
+          </a:ln>
+        </p:spPr>
+        <p:style>
+          <a:lnRef idx="2">
+            <a:schemeClr val="dk1"/>
+          </a:lnRef>
+          <a:fillRef idx="1">
+            <a:schemeClr val="lt1"/>
+          </a:fillRef>
+          <a:effectRef idx="0">
+            <a:schemeClr val="dk1"/>
+          </a:effectRef>
+          <a:fontRef idx="minor">
+            <a:schemeClr val="dk1"/>
+          </a:fontRef>
+        </p:style>
+        <p:txBody>
+          <a:bodyPr rtlCol="0" anchor="ctr"/>
+          <a:lstStyle/>
+          <a:p>
+            <a:pPr algn="ctr"/>
+            <a:r>
+              <a:rPr lang="de-DE" dirty="0" smtClean="0"/>
+              <a:t>Fading</a:t>
+            </a:r>
+            <a:endParaRPr lang="de-DE" dirty="0"/>
+          </a:p>
+        </p:txBody>
+      </p:sp>
+      <p:sp>
+        <p:nvSpPr>
+          <p:cNvPr id="18" name="Rechteck 17"/>
+          <p:cNvSpPr/>
+          <p:nvPr/>
+        </p:nvSpPr>
+        <p:spPr>
+          <a:xfrm>
+            <a:off x="10158251" y="3089188"/>
+            <a:ext cx="1012258" cy="584888"/>
+          </a:xfrm>
+          <a:prstGeom prst="rect">
+            <a:avLst/>
+          </a:prstGeom>
+          <a:ln>
+            <a:solidFill>
+              <a:schemeClr val="bg1"/>
+            </a:solidFill>
+          </a:ln>
+        </p:spPr>
+        <p:style>
+          <a:lnRef idx="2">
+            <a:schemeClr val="dk1"/>
+          </a:lnRef>
+          <a:fillRef idx="1">
+            <a:schemeClr val="lt1"/>
+          </a:fillRef>
+          <a:effectRef idx="0">
+            <a:schemeClr val="dk1"/>
+          </a:effectRef>
+          <a:fontRef idx="minor">
+            <a:schemeClr val="dk1"/>
+          </a:fontRef>
+        </p:style>
+        <p:txBody>
+          <a:bodyPr rtlCol="0" anchor="ctr"/>
+          <a:lstStyle/>
+          <a:p>
+            <a:pPr algn="ctr"/>
+            <a:r>
+              <a:rPr lang="de-DE" dirty="0" smtClean="0"/>
+              <a:t>Noise</a:t>
+            </a:r>
+            <a:endParaRPr lang="de-DE" dirty="0"/>
+          </a:p>
+        </p:txBody>
+      </p:sp>
+      <p:sp>
+        <p:nvSpPr>
+          <p:cNvPr id="19" name="Rechteck 18"/>
+          <p:cNvSpPr/>
+          <p:nvPr/>
+        </p:nvSpPr>
+        <p:spPr>
+          <a:xfrm>
+            <a:off x="8911890" y="5074507"/>
+            <a:ext cx="1436893" cy="296562"/>
+          </a:xfrm>
+          <a:prstGeom prst="rect">
+            <a:avLst/>
+          </a:prstGeom>
+          <a:ln>
+            <a:solidFill>
+              <a:schemeClr val="bg1"/>
+            </a:solidFill>
+          </a:ln>
+        </p:spPr>
+        <p:style>
+          <a:lnRef idx="2">
+            <a:schemeClr val="accent6"/>
+          </a:lnRef>
+          <a:fillRef idx="1">
+            <a:schemeClr val="lt1"/>
+          </a:fillRef>
+          <a:effectRef idx="0">
+            <a:schemeClr val="accent6"/>
+          </a:effectRef>
+          <a:fontRef idx="minor">
+            <a:schemeClr val="dk1"/>
+          </a:fontRef>
+        </p:style>
+        <p:txBody>
+          <a:bodyPr rtlCol="0" anchor="ctr"/>
+          <a:lstStyle/>
+          <a:p>
+            <a:pPr algn="ctr"/>
+            <a:r>
+              <a:rPr lang="de-DE" dirty="0" smtClean="0"/>
+              <a:t>Channel</a:t>
+            </a:r>
+            <a:endParaRPr lang="de-DE" dirty="0"/>
+          </a:p>
+        </p:txBody>
+      </p:sp>
+    </p:spTree>
+    <p:extLst>
+      <p:ext uri="{BB962C8B-B14F-4D97-AF65-F5344CB8AC3E}">
+        <p14:creationId xmlns:p14="http://schemas.microsoft.com/office/powerpoint/2010/main" val="2257415037"/>
       </p:ext>
     </p:extLst>
   </p:cSld>

</xml_diff>

<commit_message>
Final draft. Edit 1.
</commit_message>
<xml_diff>
--- a/Bachelorarbeit/01_Bachelorarbeit_LaTex/02_Figures/interferences.pptx
+++ b/Bachelorarbeit/01_Bachelorarbeit_LaTex/02_Figures/interferences.pptx
@@ -275,7 +275,7 @@
           <a:p>
             <a:fld id="{269D1000-EB28-4F8D-8A17-2635A5EDEDA0}" type="datetimeFigureOut">
               <a:rPr lang="de-DE" smtClean="0"/>
-              <a:t>12.01.2018</a:t>
+              <a:t>13.01.2018</a:t>
             </a:fld>
             <a:endParaRPr lang="de-DE"/>
           </a:p>
@@ -445,7 +445,7 @@
           <a:p>
             <a:fld id="{269D1000-EB28-4F8D-8A17-2635A5EDEDA0}" type="datetimeFigureOut">
               <a:rPr lang="de-DE" smtClean="0"/>
-              <a:t>12.01.2018</a:t>
+              <a:t>13.01.2018</a:t>
             </a:fld>
             <a:endParaRPr lang="de-DE"/>
           </a:p>
@@ -625,7 +625,7 @@
           <a:p>
             <a:fld id="{269D1000-EB28-4F8D-8A17-2635A5EDEDA0}" type="datetimeFigureOut">
               <a:rPr lang="de-DE" smtClean="0"/>
-              <a:t>12.01.2018</a:t>
+              <a:t>13.01.2018</a:t>
             </a:fld>
             <a:endParaRPr lang="de-DE"/>
           </a:p>
@@ -795,7 +795,7 @@
           <a:p>
             <a:fld id="{269D1000-EB28-4F8D-8A17-2635A5EDEDA0}" type="datetimeFigureOut">
               <a:rPr lang="de-DE" smtClean="0"/>
-              <a:t>12.01.2018</a:t>
+              <a:t>13.01.2018</a:t>
             </a:fld>
             <a:endParaRPr lang="de-DE"/>
           </a:p>
@@ -1041,7 +1041,7 @@
           <a:p>
             <a:fld id="{269D1000-EB28-4F8D-8A17-2635A5EDEDA0}" type="datetimeFigureOut">
               <a:rPr lang="de-DE" smtClean="0"/>
-              <a:t>12.01.2018</a:t>
+              <a:t>13.01.2018</a:t>
             </a:fld>
             <a:endParaRPr lang="de-DE"/>
           </a:p>
@@ -1273,7 +1273,7 @@
           <a:p>
             <a:fld id="{269D1000-EB28-4F8D-8A17-2635A5EDEDA0}" type="datetimeFigureOut">
               <a:rPr lang="de-DE" smtClean="0"/>
-              <a:t>12.01.2018</a:t>
+              <a:t>13.01.2018</a:t>
             </a:fld>
             <a:endParaRPr lang="de-DE"/>
           </a:p>
@@ -1640,7 +1640,7 @@
           <a:p>
             <a:fld id="{269D1000-EB28-4F8D-8A17-2635A5EDEDA0}" type="datetimeFigureOut">
               <a:rPr lang="de-DE" smtClean="0"/>
-              <a:t>12.01.2018</a:t>
+              <a:t>13.01.2018</a:t>
             </a:fld>
             <a:endParaRPr lang="de-DE"/>
           </a:p>
@@ -1758,7 +1758,7 @@
           <a:p>
             <a:fld id="{269D1000-EB28-4F8D-8A17-2635A5EDEDA0}" type="datetimeFigureOut">
               <a:rPr lang="de-DE" smtClean="0"/>
-              <a:t>12.01.2018</a:t>
+              <a:t>13.01.2018</a:t>
             </a:fld>
             <a:endParaRPr lang="de-DE"/>
           </a:p>
@@ -1853,7 +1853,7 @@
           <a:p>
             <a:fld id="{269D1000-EB28-4F8D-8A17-2635A5EDEDA0}" type="datetimeFigureOut">
               <a:rPr lang="de-DE" smtClean="0"/>
-              <a:t>12.01.2018</a:t>
+              <a:t>13.01.2018</a:t>
             </a:fld>
             <a:endParaRPr lang="de-DE"/>
           </a:p>
@@ -2130,7 +2130,7 @@
           <a:p>
             <a:fld id="{269D1000-EB28-4F8D-8A17-2635A5EDEDA0}" type="datetimeFigureOut">
               <a:rPr lang="de-DE" smtClean="0"/>
-              <a:t>12.01.2018</a:t>
+              <a:t>13.01.2018</a:t>
             </a:fld>
             <a:endParaRPr lang="de-DE"/>
           </a:p>
@@ -2383,7 +2383,7 @@
           <a:p>
             <a:fld id="{269D1000-EB28-4F8D-8A17-2635A5EDEDA0}" type="datetimeFigureOut">
               <a:rPr lang="de-DE" smtClean="0"/>
-              <a:t>12.01.2018</a:t>
+              <a:t>13.01.2018</a:t>
             </a:fld>
             <a:endParaRPr lang="de-DE"/>
           </a:p>
@@ -2596,7 +2596,7 @@
           <a:p>
             <a:fld id="{269D1000-EB28-4F8D-8A17-2635A5EDEDA0}" type="datetimeFigureOut">
               <a:rPr lang="de-DE" smtClean="0"/>
-              <a:t>12.01.2018</a:t>
+              <a:t>13.01.2018</a:t>
             </a:fld>
             <a:endParaRPr lang="de-DE"/>
           </a:p>
@@ -6202,7 +6202,7 @@
                 <a:latin typeface="Arial" panose="020B0604020202020204" pitchFamily="34" charset="0"/>
                 <a:cs typeface="Arial" panose="020B0604020202020204" pitchFamily="34" charset="0"/>
               </a:rPr>
-              <a:t>Inphase</a:t>
+              <a:t>I</a:t>
             </a:r>
             <a:endParaRPr lang="de-DE" sz="2000" dirty="0">
               <a:latin typeface="Arial" panose="020B0604020202020204" pitchFamily="34" charset="0"/>
@@ -6220,7 +6220,7 @@
         <p:spPr>
           <a:xfrm>
             <a:off x="6200919" y="118528"/>
-            <a:ext cx="1572340" cy="707886"/>
+            <a:ext cx="1572340" cy="400110"/>
           </a:xfrm>
           <a:prstGeom prst="rect">
             <a:avLst/>
@@ -6238,7 +6238,7 @@
                 <a:latin typeface="Arial" panose="020B0604020202020204" pitchFamily="34" charset="0"/>
                 <a:cs typeface="Arial" panose="020B0604020202020204" pitchFamily="34" charset="0"/>
               </a:rPr>
-              <a:t>Quadrature phase</a:t>
+              <a:t>Q</a:t>
             </a:r>
             <a:endParaRPr lang="de-DE" sz="2000" dirty="0">
               <a:latin typeface="Arial" panose="020B0604020202020204" pitchFamily="34" charset="0"/>
@@ -8375,7 +8375,6 @@
               <a:rPr lang="de-DE" dirty="0"/>
               <a:t>Y</a:t>
             </a:r>
-            <a:endParaRPr lang="de-DE" dirty="0"/>
           </a:p>
         </p:txBody>
       </p:sp>
@@ -9377,7 +9376,7 @@
                 <a:latin typeface="Arial" panose="020B0604020202020204" pitchFamily="34" charset="0"/>
                 <a:cs typeface="Arial" panose="020B0604020202020204" pitchFamily="34" charset="0"/>
               </a:rPr>
-              <a:t>Inphase</a:t>
+              <a:t>I</a:t>
             </a:r>
             <a:endParaRPr lang="de-DE" sz="2000" dirty="0">
               <a:latin typeface="Arial" panose="020B0604020202020204" pitchFamily="34" charset="0"/>
@@ -9395,7 +9394,7 @@
         <p:spPr>
           <a:xfrm>
             <a:off x="6200919" y="118528"/>
-            <a:ext cx="1572340" cy="707886"/>
+            <a:ext cx="1572340" cy="400110"/>
           </a:xfrm>
           <a:prstGeom prst="rect">
             <a:avLst/>
@@ -9413,7 +9412,7 @@
                 <a:latin typeface="Arial" panose="020B0604020202020204" pitchFamily="34" charset="0"/>
                 <a:cs typeface="Arial" panose="020B0604020202020204" pitchFamily="34" charset="0"/>
               </a:rPr>
-              <a:t>Quadrature phase</a:t>
+              <a:t>Q</a:t>
             </a:r>
             <a:endParaRPr lang="de-DE" sz="2000" dirty="0">
               <a:latin typeface="Arial" panose="020B0604020202020204" pitchFamily="34" charset="0"/>
@@ -9844,42 +9843,6 @@
       </p:cxnSp>
       <p:sp>
         <p:nvSpPr>
-          <p:cNvPr id="35" name="Textfeld 34"/>
-          <p:cNvSpPr txBox="1"/>
-          <p:nvPr/>
-        </p:nvSpPr>
-        <p:spPr>
-          <a:xfrm>
-            <a:off x="9201900" y="2583065"/>
-            <a:ext cx="2463711" cy="707886"/>
-          </a:xfrm>
-          <a:prstGeom prst="rect">
-            <a:avLst/>
-          </a:prstGeom>
-          <a:noFill/>
-        </p:spPr>
-        <p:txBody>
-          <a:bodyPr wrap="square" rtlCol="0">
-            <a:spAutoFit/>
-          </a:bodyPr>
-          <a:lstStyle/>
-          <a:p>
-            <a:r>
-              <a:rPr lang="de-DE" sz="2000" dirty="0" smtClean="0">
-                <a:latin typeface="Arial" panose="020B0604020202020204" pitchFamily="34" charset="0"/>
-                <a:cs typeface="Arial" panose="020B0604020202020204" pitchFamily="34" charset="0"/>
-              </a:rPr>
-              <a:t>Differentiation between bit 1</a:t>
-            </a:r>
-            <a:endParaRPr lang="de-DE" sz="2000" dirty="0">
-              <a:latin typeface="Arial" panose="020B0604020202020204" pitchFamily="34" charset="0"/>
-              <a:cs typeface="Arial" panose="020B0604020202020204" pitchFamily="34" charset="0"/>
-            </a:endParaRPr>
-          </a:p>
-        </p:txBody>
-      </p:sp>
-      <p:sp>
-        <p:nvSpPr>
           <p:cNvPr id="38" name="Textfeld 37"/>
           <p:cNvSpPr txBox="1"/>
           <p:nvPr/>
@@ -10062,7 +10025,7 @@
         <p:spPr>
           <a:xfrm flipH="1">
             <a:off x="8206718" y="1187142"/>
-            <a:ext cx="122816" cy="167426"/>
+            <a:ext cx="122816" cy="137805"/>
           </a:xfrm>
           <a:prstGeom prst="ellipse">
             <a:avLst/>
@@ -10120,7 +10083,14 @@
                 <a:latin typeface="Arial" panose="020B0604020202020204" pitchFamily="34" charset="0"/>
                 <a:cs typeface="Arial" panose="020B0604020202020204" pitchFamily="34" charset="0"/>
               </a:rPr>
-              <a:t>Constellation Point</a:t>
+              <a:t>Constellation </a:t>
+            </a:r>
+            <a:r>
+              <a:rPr lang="de-DE" sz="2000" dirty="0" smtClean="0">
+                <a:latin typeface="Arial" panose="020B0604020202020204" pitchFamily="34" charset="0"/>
+                <a:cs typeface="Arial" panose="020B0604020202020204" pitchFamily="34" charset="0"/>
+              </a:rPr>
+              <a:t>Symbol</a:t>
             </a:r>
             <a:endParaRPr lang="de-DE" sz="2000" dirty="0">
               <a:latin typeface="Arial" panose="020B0604020202020204" pitchFamily="34" charset="0"/>

</xml_diff>